<commit_message>
updated presentation with all strategies
</commit_message>
<xml_diff>
--- a/final-work-presentation.pptx
+++ b/final-work-presentation.pptx
@@ -10,9 +10,8 @@
     <p:sldId id="259" r:id="rId4"/>
     <p:sldId id="263" r:id="rId5"/>
     <p:sldId id="260" r:id="rId6"/>
-    <p:sldId id="261" r:id="rId7"/>
-    <p:sldId id="262" r:id="rId8"/>
-    <p:sldId id="258" r:id="rId9"/>
+    <p:sldId id="262" r:id="rId7"/>
+    <p:sldId id="258" r:id="rId8"/>
   </p:sldIdLst>
   <p:sldSz cx="12192000" cy="6858000"/>
   <p:notesSz cx="6858000" cy="9144000"/>
@@ -111,6 +110,11 @@
       </a:defRPr>
     </a:lvl9pPr>
   </p:defaultTextStyle>
+  <p:extLst>
+    <p:ext uri="{EFAFB233-063F-42B5-8137-9DF3F51BA10A}">
+      <p15:sldGuideLst xmlns:p15="http://schemas.microsoft.com/office/powerpoint/2012/main"/>
+    </p:ext>
+  </p:extLst>
 </p:presentation>
 </file>
 
@@ -836,7 +840,7 @@
           <a:p>
             <a:fld id="{EBF90E3C-EDC4-0143-8B21-D5720BB929E2}" type="datetimeFigureOut">
               <a:rPr lang="de-ES" smtClean="0"/>
-              <a:t>10/12/21</a:t>
+              <a:t>13/12/21</a:t>
             </a:fld>
             <a:endParaRPr lang="de-ES"/>
           </a:p>
@@ -1087,7 +1091,7 @@
           <a:p>
             <a:fld id="{EBF90E3C-EDC4-0143-8B21-D5720BB929E2}" type="datetimeFigureOut">
               <a:rPr lang="de-ES" smtClean="0"/>
-              <a:t>10/12/21</a:t>
+              <a:t>13/12/21</a:t>
             </a:fld>
             <a:endParaRPr lang="de-ES"/>
           </a:p>
@@ -1401,7 +1405,7 @@
           <a:p>
             <a:fld id="{EBF90E3C-EDC4-0143-8B21-D5720BB929E2}" type="datetimeFigureOut">
               <a:rPr lang="de-ES" smtClean="0"/>
-              <a:t>10/12/21</a:t>
+              <a:t>13/12/21</a:t>
             </a:fld>
             <a:endParaRPr lang="de-ES"/>
           </a:p>
@@ -1742,7 +1746,7 @@
           <a:p>
             <a:fld id="{EBF90E3C-EDC4-0143-8B21-D5720BB929E2}" type="datetimeFigureOut">
               <a:rPr lang="de-ES" smtClean="0"/>
-              <a:t>10/12/21</a:t>
+              <a:t>13/12/21</a:t>
             </a:fld>
             <a:endParaRPr lang="de-ES"/>
           </a:p>
@@ -2056,7 +2060,7 @@
           <a:p>
             <a:fld id="{EBF90E3C-EDC4-0143-8B21-D5720BB929E2}" type="datetimeFigureOut">
               <a:rPr lang="de-ES" smtClean="0"/>
-              <a:t>10/12/21</a:t>
+              <a:t>13/12/21</a:t>
             </a:fld>
             <a:endParaRPr lang="de-ES"/>
           </a:p>
@@ -2449,7 +2453,7 @@
           <a:p>
             <a:fld id="{EBF90E3C-EDC4-0143-8B21-D5720BB929E2}" type="datetimeFigureOut">
               <a:rPr lang="de-ES" smtClean="0"/>
-              <a:t>10/12/21</a:t>
+              <a:t>13/12/21</a:t>
             </a:fld>
             <a:endParaRPr lang="de-ES"/>
           </a:p>
@@ -2619,7 +2623,7 @@
           <a:p>
             <a:fld id="{EBF90E3C-EDC4-0143-8B21-D5720BB929E2}" type="datetimeFigureOut">
               <a:rPr lang="de-ES" smtClean="0"/>
-              <a:t>10/12/21</a:t>
+              <a:t>13/12/21</a:t>
             </a:fld>
             <a:endParaRPr lang="de-ES"/>
           </a:p>
@@ -2799,7 +2803,7 @@
           <a:p>
             <a:fld id="{EBF90E3C-EDC4-0143-8B21-D5720BB929E2}" type="datetimeFigureOut">
               <a:rPr lang="de-ES" smtClean="0"/>
-              <a:t>10/12/21</a:t>
+              <a:t>13/12/21</a:t>
             </a:fld>
             <a:endParaRPr lang="de-ES"/>
           </a:p>
@@ -2975,7 +2979,7 @@
           <a:p>
             <a:fld id="{EBF90E3C-EDC4-0143-8B21-D5720BB929E2}" type="datetimeFigureOut">
               <a:rPr lang="de-ES" smtClean="0"/>
-              <a:t>10/12/21</a:t>
+              <a:t>13/12/21</a:t>
             </a:fld>
             <a:endParaRPr lang="de-ES"/>
           </a:p>
@@ -3222,7 +3226,7 @@
           <a:p>
             <a:fld id="{EBF90E3C-EDC4-0143-8B21-D5720BB929E2}" type="datetimeFigureOut">
               <a:rPr lang="de-ES" smtClean="0"/>
-              <a:t>10/12/21</a:t>
+              <a:t>13/12/21</a:t>
             </a:fld>
             <a:endParaRPr lang="de-ES"/>
           </a:p>
@@ -3454,7 +3458,7 @@
           <a:p>
             <a:fld id="{EBF90E3C-EDC4-0143-8B21-D5720BB929E2}" type="datetimeFigureOut">
               <a:rPr lang="de-ES" smtClean="0"/>
-              <a:t>10/12/21</a:t>
+              <a:t>13/12/21</a:t>
             </a:fld>
             <a:endParaRPr lang="de-ES"/>
           </a:p>
@@ -3828,7 +3832,7 @@
           <a:p>
             <a:fld id="{EBF90E3C-EDC4-0143-8B21-D5720BB929E2}" type="datetimeFigureOut">
               <a:rPr lang="de-ES" smtClean="0"/>
-              <a:t>10/12/21</a:t>
+              <a:t>13/12/21</a:t>
             </a:fld>
             <a:endParaRPr lang="de-ES"/>
           </a:p>
@@ -3951,7 +3955,7 @@
           <a:p>
             <a:fld id="{EBF90E3C-EDC4-0143-8B21-D5720BB929E2}" type="datetimeFigureOut">
               <a:rPr lang="de-ES" smtClean="0"/>
-              <a:t>10/12/21</a:t>
+              <a:t>13/12/21</a:t>
             </a:fld>
             <a:endParaRPr lang="de-ES"/>
           </a:p>
@@ -4046,7 +4050,7 @@
           <a:p>
             <a:fld id="{EBF90E3C-EDC4-0143-8B21-D5720BB929E2}" type="datetimeFigureOut">
               <a:rPr lang="de-ES" smtClean="0"/>
-              <a:t>10/12/21</a:t>
+              <a:t>13/12/21</a:t>
             </a:fld>
             <a:endParaRPr lang="de-ES"/>
           </a:p>
@@ -4301,7 +4305,7 @@
           <a:p>
             <a:fld id="{EBF90E3C-EDC4-0143-8B21-D5720BB929E2}" type="datetimeFigureOut">
               <a:rPr lang="de-ES" smtClean="0"/>
-              <a:t>10/12/21</a:t>
+              <a:t>13/12/21</a:t>
             </a:fld>
             <a:endParaRPr lang="de-ES"/>
           </a:p>
@@ -4564,7 +4568,7 @@
           <a:p>
             <a:fld id="{EBF90E3C-EDC4-0143-8B21-D5720BB929E2}" type="datetimeFigureOut">
               <a:rPr lang="de-ES" smtClean="0"/>
-              <a:t>10/12/21</a:t>
+              <a:t>13/12/21</a:t>
             </a:fld>
             <a:endParaRPr lang="de-ES"/>
           </a:p>
@@ -5307,7 +5311,7 @@
           <a:p>
             <a:fld id="{EBF90E3C-EDC4-0143-8B21-D5720BB929E2}" type="datetimeFigureOut">
               <a:rPr lang="de-ES" smtClean="0"/>
-              <a:t>10/12/21</a:t>
+              <a:t>13/12/21</a:t>
             </a:fld>
             <a:endParaRPr lang="de-ES"/>
           </a:p>
@@ -5973,8 +5977,53 @@
         </p:nvSpPr>
         <p:spPr/>
         <p:txBody>
-          <a:bodyPr/>
+          <a:bodyPr>
+            <a:normAutofit/>
+          </a:bodyPr>
           <a:lstStyle/>
+          <a:p>
+            <a:r>
+              <a:rPr lang="en-GB" dirty="0"/>
+              <a:t>Both Teams:</a:t>
+            </a:r>
+          </a:p>
+          <a:p>
+            <a:pPr lvl="1"/>
+            <a:r>
+              <a:rPr lang="en-GB" dirty="0"/>
+              <a:t>Prevent friendly fire</a:t>
+            </a:r>
+          </a:p>
+          <a:p>
+            <a:pPr lvl="1"/>
+            <a:r>
+              <a:rPr lang="en-GB" dirty="0"/>
+              <a:t>prevent responding to cfm and </a:t>
+            </a:r>
+            <a:r>
+              <a:rPr lang="en-GB" dirty="0" err="1"/>
+              <a:t>cfa</a:t>
+            </a:r>
+            <a:r>
+              <a:rPr lang="en-GB" dirty="0"/>
+              <a:t> from the enemy</a:t>
+            </a:r>
+          </a:p>
+          <a:p>
+            <a:pPr lvl="1"/>
+            <a:r>
+              <a:rPr lang="en-GB" dirty="0"/>
+              <a:t>Send cfm and </a:t>
+            </a:r>
+            <a:r>
+              <a:rPr lang="en-GB" dirty="0" err="1"/>
+              <a:t>cfa</a:t>
+            </a:r>
+            <a:r>
+              <a:rPr lang="en-GB" dirty="0"/>
+              <a:t> to the enemy</a:t>
+            </a:r>
+          </a:p>
           <a:p>
             <a:r>
               <a:rPr lang="en-GB" dirty="0"/>
@@ -5985,21 +6034,7 @@
             <a:pPr lvl="1"/>
             <a:r>
               <a:rPr lang="en-GB" dirty="0"/>
-              <a:t>prevent shooting teammates</a:t>
-            </a:r>
-          </a:p>
-          <a:p>
-            <a:pPr lvl="1"/>
-            <a:r>
-              <a:rPr lang="en-GB" dirty="0"/>
-              <a:t>prevent responding to messages from the enemy</a:t>
-            </a:r>
-          </a:p>
-          <a:p>
-            <a:pPr lvl="1"/>
-            <a:r>
-              <a:rPr lang="en-GB" dirty="0"/>
-              <a:t>follow agent that captured the flag back to the basis</a:t>
+              <a:t>follow agent that captured the flag back to the basis to protect him</a:t>
             </a:r>
           </a:p>
           <a:p>
@@ -6012,22 +6047,13 @@
             <a:pPr lvl="1"/>
             <a:r>
               <a:rPr lang="en-GB" dirty="0"/>
-              <a:t>prevent shooting teammates</a:t>
-            </a:r>
-          </a:p>
-          <a:p>
-            <a:pPr lvl="1"/>
-            <a:r>
-              <a:rPr lang="en-GB" dirty="0"/>
-              <a:t>prevent responding to messages from the enemy</a:t>
-            </a:r>
-          </a:p>
-          <a:p>
-            <a:pPr lvl="1"/>
-            <a:r>
-              <a:rPr lang="en-GB" dirty="0"/>
-              <a:t>Decrease patrolling radius around the flag</a:t>
-            </a:r>
+              <a:t>Decrease patrolling radius around the flag, </a:t>
+            </a:r>
+            <a:r>
+              <a:rPr lang="en-GB"/>
+              <a:t>new radius = 24</a:t>
+            </a:r>
+            <a:endParaRPr lang="en-GB" dirty="0"/>
           </a:p>
           <a:p>
             <a:pPr lvl="1"/>
@@ -6035,10 +6061,6 @@
               <a:rPr lang="en-GB" dirty="0"/>
               <a:t>Follow Allied and try to shoot them if they captured the flag</a:t>
             </a:r>
-          </a:p>
-          <a:p>
-            <a:pPr lvl="1"/>
-            <a:endParaRPr lang="en-GB" dirty="0"/>
           </a:p>
         </p:txBody>
       </p:sp>
@@ -6100,7 +6122,7 @@
           <a:p>
             <a:r>
               <a:rPr lang="de-ES" dirty="0"/>
-              <a:t>Allied &amp; Axis: Prevent shooting teammates</a:t>
+              <a:t>Allied &amp; Axis: Prevent friendly fire</a:t>
             </a:r>
           </a:p>
         </p:txBody>
@@ -6325,23 +6347,30 @@
                 <a:latin typeface="Courier New" panose="02070309020205020404" pitchFamily="49" charset="0"/>
                 <a:cs typeface="Courier New" panose="02070309020205020404" pitchFamily="49" charset="0"/>
               </a:rPr>
-              <a:t>    // Object structure</a:t>
+              <a:t>    </a:t>
+            </a:r>
+            <a:r>
+              <a:rPr lang="en-GB" sz="1200" dirty="0">
+                <a:latin typeface="Courier New" panose="02070309020205020404" pitchFamily="49" charset="0"/>
+                <a:cs typeface="Courier New" panose="02070309020205020404" pitchFamily="49" charset="0"/>
+              </a:rPr>
+              <a:t>// Object structure</a:t>
             </a:r>
             <a:br>
-              <a:rPr lang="en-GB" sz="1200" b="1" dirty="0">
+              <a:rPr lang="en-GB" sz="1200" dirty="0">
                 <a:latin typeface="Courier New" panose="02070309020205020404" pitchFamily="49" charset="0"/>
                 <a:cs typeface="Courier New" panose="02070309020205020404" pitchFamily="49" charset="0"/>
               </a:rPr>
             </a:br>
             <a:r>
-              <a:rPr lang="en-GB" sz="1200" b="1" dirty="0">
+              <a:rPr lang="en-GB" sz="1200" dirty="0">
                 <a:latin typeface="Courier New" panose="02070309020205020404" pitchFamily="49" charset="0"/>
                 <a:cs typeface="Courier New" panose="02070309020205020404" pitchFamily="49" charset="0"/>
               </a:rPr>
               <a:t>    // [#, TEAM, TYPE, ANGLE, DISTANCE, HEALTH, POSITION ]</a:t>
             </a:r>
             <a:br>
-              <a:rPr lang="en-GB" sz="1200" b="1" dirty="0">
+              <a:rPr lang="en-GB" sz="1200" dirty="0">
                 <a:latin typeface="Courier New" panose="02070309020205020404" pitchFamily="49" charset="0"/>
                 <a:cs typeface="Courier New" panose="02070309020205020404" pitchFamily="49" charset="0"/>
               </a:rPr>
@@ -6818,7 +6847,7 @@
           <a:p>
             <a:r>
               <a:rPr lang="de-ES" dirty="0"/>
-              <a:t>Allied &amp; Axis: prevent responding to messages from the enemy</a:t>
+              <a:t>Allied &amp; Axis: prevent responding to cfm, cfa from the enemy</a:t>
             </a:r>
           </a:p>
         </p:txBody>
@@ -6839,36 +6868,722 @@
             <p:ph idx="1"/>
           </p:nvPr>
         </p:nvSpPr>
-        <p:spPr/>
-        <p:txBody>
-          <a:bodyPr/>
+        <p:spPr>
+          <a:xfrm>
+            <a:off x="677334" y="2160589"/>
+            <a:ext cx="8596668" cy="4087811"/>
+          </a:xfrm>
+        </p:spPr>
+        <p:txBody>
+          <a:bodyPr>
+            <a:normAutofit fontScale="85000" lnSpcReduction="20000"/>
+          </a:bodyPr>
           <a:lstStyle/>
           <a:p>
             <a:pPr marL="0" indent="0">
               <a:buNone/>
             </a:pPr>
             <a:r>
+              <a:rPr lang="de-DE" dirty="0"/>
+              <a:t>F</a:t>
+            </a:r>
+            <a:r>
               <a:rPr lang="de-ES" dirty="0"/>
-              <a:t>//insert code here</a:t>
+              <a:t>or medics cfm:</a:t>
             </a:r>
           </a:p>
           <a:p>
             <a:pPr marL="0" indent="0">
               <a:buNone/>
             </a:pPr>
-            <a:endParaRPr lang="de-ES" dirty="0"/>
+            <a:r>
+              <a:rPr lang="de-DE" b="1" dirty="0">
+                <a:latin typeface="Courier New" panose="02070309020205020404" pitchFamily="49" charset="0"/>
+                <a:cs typeface="Courier New" panose="02070309020205020404" pitchFamily="49" charset="0"/>
+              </a:rPr>
+              <a:t>+!</a:t>
+            </a:r>
+            <a:r>
+              <a:rPr lang="de-DE" b="1" dirty="0" err="1">
+                <a:latin typeface="Courier New" panose="02070309020205020404" pitchFamily="49" charset="0"/>
+                <a:cs typeface="Courier New" panose="02070309020205020404" pitchFamily="49" charset="0"/>
+              </a:rPr>
+              <a:t>checkMedicAction</a:t>
+            </a:r>
+            <a:br>
+              <a:rPr lang="de-DE" b="1" dirty="0">
+                <a:latin typeface="Courier New" panose="02070309020205020404" pitchFamily="49" charset="0"/>
+                <a:cs typeface="Courier New" panose="02070309020205020404" pitchFamily="49" charset="0"/>
+              </a:rPr>
+            </a:br>
+            <a:r>
+              <a:rPr lang="de-DE" b="1" dirty="0">
+                <a:latin typeface="Courier New" panose="02070309020205020404" pitchFamily="49" charset="0"/>
+                <a:cs typeface="Courier New" panose="02070309020205020404" pitchFamily="49" charset="0"/>
+              </a:rPr>
+              <a:t>     &lt;-  ?</a:t>
+            </a:r>
+            <a:r>
+              <a:rPr lang="de-DE" b="1" dirty="0" err="1">
+                <a:latin typeface="Courier New" panose="02070309020205020404" pitchFamily="49" charset="0"/>
+                <a:cs typeface="Courier New" panose="02070309020205020404" pitchFamily="49" charset="0"/>
+              </a:rPr>
+              <a:t>cfm</a:t>
+            </a:r>
+            <a:r>
+              <a:rPr lang="de-DE" b="1" dirty="0">
+                <a:latin typeface="Courier New" panose="02070309020205020404" pitchFamily="49" charset="0"/>
+                <a:cs typeface="Courier New" panose="02070309020205020404" pitchFamily="49" charset="0"/>
+              </a:rPr>
+              <a:t>(</a:t>
+            </a:r>
+            <a:r>
+              <a:rPr lang="de-DE" b="1" dirty="0" err="1">
+                <a:latin typeface="Courier New" panose="02070309020205020404" pitchFamily="49" charset="0"/>
+                <a:cs typeface="Courier New" panose="02070309020205020404" pitchFamily="49" charset="0"/>
+              </a:rPr>
+              <a:t>Xcma</a:t>
+            </a:r>
+            <a:r>
+              <a:rPr lang="de-DE" b="1" dirty="0">
+                <a:latin typeface="Courier New" panose="02070309020205020404" pitchFamily="49" charset="0"/>
+                <a:cs typeface="Courier New" panose="02070309020205020404" pitchFamily="49" charset="0"/>
+              </a:rPr>
+              <a:t>, </a:t>
+            </a:r>
+            <a:r>
+              <a:rPr lang="de-DE" b="1" dirty="0" err="1">
+                <a:latin typeface="Courier New" panose="02070309020205020404" pitchFamily="49" charset="0"/>
+                <a:cs typeface="Courier New" panose="02070309020205020404" pitchFamily="49" charset="0"/>
+              </a:rPr>
+              <a:t>Ycma</a:t>
+            </a:r>
+            <a:r>
+              <a:rPr lang="de-DE" b="1" dirty="0">
+                <a:latin typeface="Courier New" panose="02070309020205020404" pitchFamily="49" charset="0"/>
+                <a:cs typeface="Courier New" panose="02070309020205020404" pitchFamily="49" charset="0"/>
+              </a:rPr>
+              <a:t>, </a:t>
+            </a:r>
+            <a:r>
+              <a:rPr lang="de-DE" b="1" dirty="0" err="1">
+                <a:latin typeface="Courier New" panose="02070309020205020404" pitchFamily="49" charset="0"/>
+                <a:cs typeface="Courier New" panose="02070309020205020404" pitchFamily="49" charset="0"/>
+              </a:rPr>
+              <a:t>Zcma</a:t>
+            </a:r>
+            <a:r>
+              <a:rPr lang="de-DE" b="1" dirty="0">
+                <a:latin typeface="Courier New" panose="02070309020205020404" pitchFamily="49" charset="0"/>
+                <a:cs typeface="Courier New" panose="02070309020205020404" pitchFamily="49" charset="0"/>
+              </a:rPr>
+              <a:t>, </a:t>
+            </a:r>
+            <a:r>
+              <a:rPr lang="de-DE" b="1" dirty="0" err="1">
+                <a:latin typeface="Courier New" panose="02070309020205020404" pitchFamily="49" charset="0"/>
+                <a:cs typeface="Courier New" panose="02070309020205020404" pitchFamily="49" charset="0"/>
+              </a:rPr>
+              <a:t>Saludcma</a:t>
+            </a:r>
+            <a:r>
+              <a:rPr lang="de-DE" b="1" dirty="0">
+                <a:latin typeface="Courier New" panose="02070309020205020404" pitchFamily="49" charset="0"/>
+                <a:cs typeface="Courier New" panose="02070309020205020404" pitchFamily="49" charset="0"/>
+              </a:rPr>
+              <a:t>)[</a:t>
+            </a:r>
+            <a:r>
+              <a:rPr lang="de-DE" b="1" dirty="0" err="1">
+                <a:latin typeface="Courier New" panose="02070309020205020404" pitchFamily="49" charset="0"/>
+                <a:cs typeface="Courier New" panose="02070309020205020404" pitchFamily="49" charset="0"/>
+              </a:rPr>
+              <a:t>source</a:t>
+            </a:r>
+            <a:r>
+              <a:rPr lang="de-DE" b="1" dirty="0">
+                <a:latin typeface="Courier New" panose="02070309020205020404" pitchFamily="49" charset="0"/>
+                <a:cs typeface="Courier New" panose="02070309020205020404" pitchFamily="49" charset="0"/>
+              </a:rPr>
+              <a:t>(</a:t>
+            </a:r>
+            <a:r>
+              <a:rPr lang="de-DE" b="1" dirty="0" err="1">
+                <a:latin typeface="Courier New" panose="02070309020205020404" pitchFamily="49" charset="0"/>
+                <a:cs typeface="Courier New" panose="02070309020205020404" pitchFamily="49" charset="0"/>
+              </a:rPr>
+              <a:t>Mcma</a:t>
+            </a:r>
+            <a:r>
+              <a:rPr lang="de-DE" b="1" dirty="0">
+                <a:latin typeface="Courier New" panose="02070309020205020404" pitchFamily="49" charset="0"/>
+                <a:cs typeface="Courier New" panose="02070309020205020404" pitchFamily="49" charset="0"/>
+              </a:rPr>
+              <a:t>)];</a:t>
+            </a:r>
+            <a:br>
+              <a:rPr lang="de-DE" b="1" dirty="0">
+                <a:latin typeface="Courier New" panose="02070309020205020404" pitchFamily="49" charset="0"/>
+                <a:cs typeface="Courier New" panose="02070309020205020404" pitchFamily="49" charset="0"/>
+              </a:rPr>
+            </a:br>
+            <a:r>
+              <a:rPr lang="de-DE" b="1" dirty="0">
+                <a:latin typeface="Courier New" panose="02070309020205020404" pitchFamily="49" charset="0"/>
+                <a:cs typeface="Courier New" panose="02070309020205020404" pitchFamily="49" charset="0"/>
+              </a:rPr>
+              <a:t>        </a:t>
+            </a:r>
+            <a:r>
+              <a:rPr lang="de-DE" b="1" dirty="0" err="1">
+                <a:latin typeface="Courier New" panose="02070309020205020404" pitchFamily="49" charset="0"/>
+                <a:cs typeface="Courier New" panose="02070309020205020404" pitchFamily="49" charset="0"/>
+              </a:rPr>
+              <a:t>if</a:t>
+            </a:r>
+            <a:r>
+              <a:rPr lang="de-DE" b="1" dirty="0">
+                <a:latin typeface="Courier New" panose="02070309020205020404" pitchFamily="49" charset="0"/>
+                <a:cs typeface="Courier New" panose="02070309020205020404" pitchFamily="49" charset="0"/>
+              </a:rPr>
+              <a:t> (</a:t>
+            </a:r>
+            <a:r>
+              <a:rPr lang="de-DE" b="1" dirty="0" err="1">
+                <a:latin typeface="Courier New" panose="02070309020205020404" pitchFamily="49" charset="0"/>
+                <a:cs typeface="Courier New" panose="02070309020205020404" pitchFamily="49" charset="0"/>
+              </a:rPr>
+              <a:t>Mcma</a:t>
+            </a:r>
+            <a:r>
+              <a:rPr lang="de-DE" b="1" dirty="0">
+                <a:latin typeface="Courier New" panose="02070309020205020404" pitchFamily="49" charset="0"/>
+                <a:cs typeface="Courier New" panose="02070309020205020404" pitchFamily="49" charset="0"/>
+              </a:rPr>
+              <a:t> == "A1" | </a:t>
+            </a:r>
+            <a:r>
+              <a:rPr lang="de-DE" b="1" dirty="0" err="1">
+                <a:latin typeface="Courier New" panose="02070309020205020404" pitchFamily="49" charset="0"/>
+                <a:cs typeface="Courier New" panose="02070309020205020404" pitchFamily="49" charset="0"/>
+              </a:rPr>
+              <a:t>Mcma</a:t>
+            </a:r>
+            <a:r>
+              <a:rPr lang="de-DE" b="1" dirty="0">
+                <a:latin typeface="Courier New" panose="02070309020205020404" pitchFamily="49" charset="0"/>
+                <a:cs typeface="Courier New" panose="02070309020205020404" pitchFamily="49" charset="0"/>
+              </a:rPr>
+              <a:t> == "A2" | </a:t>
+            </a:r>
+            <a:r>
+              <a:rPr lang="de-DE" b="1" dirty="0" err="1">
+                <a:latin typeface="Courier New" panose="02070309020205020404" pitchFamily="49" charset="0"/>
+                <a:cs typeface="Courier New" panose="02070309020205020404" pitchFamily="49" charset="0"/>
+              </a:rPr>
+              <a:t>Mcma</a:t>
+            </a:r>
+            <a:r>
+              <a:rPr lang="de-DE" b="1" dirty="0">
+                <a:latin typeface="Courier New" panose="02070309020205020404" pitchFamily="49" charset="0"/>
+                <a:cs typeface="Courier New" panose="02070309020205020404" pitchFamily="49" charset="0"/>
+              </a:rPr>
+              <a:t> == "A3" | </a:t>
+            </a:r>
+            <a:r>
+              <a:rPr lang="de-DE" b="1" dirty="0" err="1">
+                <a:latin typeface="Courier New" panose="02070309020205020404" pitchFamily="49" charset="0"/>
+                <a:cs typeface="Courier New" panose="02070309020205020404" pitchFamily="49" charset="0"/>
+              </a:rPr>
+              <a:t>Mcma</a:t>
+            </a:r>
+            <a:r>
+              <a:rPr lang="de-DE" b="1" dirty="0">
+                <a:latin typeface="Courier New" panose="02070309020205020404" pitchFamily="49" charset="0"/>
+                <a:cs typeface="Courier New" panose="02070309020205020404" pitchFamily="49" charset="0"/>
+              </a:rPr>
+              <a:t> == "A4" | </a:t>
+            </a:r>
+            <a:r>
+              <a:rPr lang="de-DE" b="1" dirty="0" err="1">
+                <a:latin typeface="Courier New" panose="02070309020205020404" pitchFamily="49" charset="0"/>
+                <a:cs typeface="Courier New" panose="02070309020205020404" pitchFamily="49" charset="0"/>
+              </a:rPr>
+              <a:t>Mcma</a:t>
+            </a:r>
+            <a:r>
+              <a:rPr lang="de-DE" b="1" dirty="0">
+                <a:latin typeface="Courier New" panose="02070309020205020404" pitchFamily="49" charset="0"/>
+                <a:cs typeface="Courier New" panose="02070309020205020404" pitchFamily="49" charset="0"/>
+              </a:rPr>
+              <a:t> == 			"A5" | </a:t>
+            </a:r>
+            <a:r>
+              <a:rPr lang="de-DE" b="1" dirty="0" err="1">
+                <a:latin typeface="Courier New" panose="02070309020205020404" pitchFamily="49" charset="0"/>
+                <a:cs typeface="Courier New" panose="02070309020205020404" pitchFamily="49" charset="0"/>
+              </a:rPr>
+              <a:t>Mcma</a:t>
+            </a:r>
+            <a:r>
+              <a:rPr lang="de-DE" b="1" dirty="0">
+                <a:latin typeface="Courier New" panose="02070309020205020404" pitchFamily="49" charset="0"/>
+                <a:cs typeface="Courier New" panose="02070309020205020404" pitchFamily="49" charset="0"/>
+              </a:rPr>
+              <a:t> == "A6" | </a:t>
+            </a:r>
+            <a:r>
+              <a:rPr lang="de-DE" b="1" dirty="0" err="1">
+                <a:latin typeface="Courier New" panose="02070309020205020404" pitchFamily="49" charset="0"/>
+                <a:cs typeface="Courier New" panose="02070309020205020404" pitchFamily="49" charset="0"/>
+              </a:rPr>
+              <a:t>Mcma</a:t>
+            </a:r>
+            <a:r>
+              <a:rPr lang="de-DE" b="1" dirty="0">
+                <a:latin typeface="Courier New" panose="02070309020205020404" pitchFamily="49" charset="0"/>
+                <a:cs typeface="Courier New" panose="02070309020205020404" pitchFamily="49" charset="0"/>
+              </a:rPr>
+              <a:t> == "A7") {</a:t>
+            </a:r>
+            <a:br>
+              <a:rPr lang="de-DE" b="1" dirty="0">
+                <a:latin typeface="Courier New" panose="02070309020205020404" pitchFamily="49" charset="0"/>
+                <a:cs typeface="Courier New" panose="02070309020205020404" pitchFamily="49" charset="0"/>
+              </a:rPr>
+            </a:br>
+            <a:r>
+              <a:rPr lang="de-DE" b="1" dirty="0">
+                <a:latin typeface="Courier New" panose="02070309020205020404" pitchFamily="49" charset="0"/>
+                <a:cs typeface="Courier New" panose="02070309020205020404" pitchFamily="49" charset="0"/>
+              </a:rPr>
+              <a:t>            -+</a:t>
+            </a:r>
+            <a:r>
+              <a:rPr lang="de-DE" b="1" dirty="0" err="1">
+                <a:latin typeface="Courier New" panose="02070309020205020404" pitchFamily="49" charset="0"/>
+                <a:cs typeface="Courier New" panose="02070309020205020404" pitchFamily="49" charset="0"/>
+              </a:rPr>
+              <a:t>medicAction</a:t>
+            </a:r>
+            <a:r>
+              <a:rPr lang="de-DE" b="1" dirty="0">
+                <a:latin typeface="Courier New" panose="02070309020205020404" pitchFamily="49" charset="0"/>
+                <a:cs typeface="Courier New" panose="02070309020205020404" pitchFamily="49" charset="0"/>
+              </a:rPr>
+              <a:t>(on);</a:t>
+            </a:r>
+            <a:br>
+              <a:rPr lang="de-DE" b="1" dirty="0">
+                <a:latin typeface="Courier New" panose="02070309020205020404" pitchFamily="49" charset="0"/>
+                <a:cs typeface="Courier New" panose="02070309020205020404" pitchFamily="49" charset="0"/>
+              </a:rPr>
+            </a:br>
+            <a:r>
+              <a:rPr lang="de-DE" b="1" dirty="0">
+                <a:latin typeface="Courier New" panose="02070309020205020404" pitchFamily="49" charset="0"/>
+                <a:cs typeface="Courier New" panose="02070309020205020404" pitchFamily="49" charset="0"/>
+              </a:rPr>
+              <a:t>        } </a:t>
+            </a:r>
+            <a:r>
+              <a:rPr lang="de-DE" b="1" dirty="0" err="1">
+                <a:latin typeface="Courier New" panose="02070309020205020404" pitchFamily="49" charset="0"/>
+                <a:cs typeface="Courier New" panose="02070309020205020404" pitchFamily="49" charset="0"/>
+              </a:rPr>
+              <a:t>else</a:t>
+            </a:r>
+            <a:r>
+              <a:rPr lang="de-DE" b="1" dirty="0">
+                <a:latin typeface="Courier New" panose="02070309020205020404" pitchFamily="49" charset="0"/>
+                <a:cs typeface="Courier New" panose="02070309020205020404" pitchFamily="49" charset="0"/>
+              </a:rPr>
+              <a:t> {</a:t>
+            </a:r>
+            <a:br>
+              <a:rPr lang="de-DE" b="1" dirty="0">
+                <a:latin typeface="Courier New" panose="02070309020205020404" pitchFamily="49" charset="0"/>
+                <a:cs typeface="Courier New" panose="02070309020205020404" pitchFamily="49" charset="0"/>
+              </a:rPr>
+            </a:br>
+            <a:r>
+              <a:rPr lang="de-DE" b="1" dirty="0">
+                <a:latin typeface="Courier New" panose="02070309020205020404" pitchFamily="49" charset="0"/>
+                <a:cs typeface="Courier New" panose="02070309020205020404" pitchFamily="49" charset="0"/>
+              </a:rPr>
+              <a:t>            -+</a:t>
+            </a:r>
+            <a:r>
+              <a:rPr lang="de-DE" b="1" dirty="0" err="1">
+                <a:latin typeface="Courier New" panose="02070309020205020404" pitchFamily="49" charset="0"/>
+                <a:cs typeface="Courier New" panose="02070309020205020404" pitchFamily="49" charset="0"/>
+              </a:rPr>
+              <a:t>medicAction</a:t>
+            </a:r>
+            <a:r>
+              <a:rPr lang="de-DE" b="1" dirty="0">
+                <a:latin typeface="Courier New" panose="02070309020205020404" pitchFamily="49" charset="0"/>
+                <a:cs typeface="Courier New" panose="02070309020205020404" pitchFamily="49" charset="0"/>
+              </a:rPr>
+              <a:t>(off);}.</a:t>
+            </a:r>
           </a:p>
           <a:p>
             <a:pPr marL="0" indent="0">
               <a:buNone/>
             </a:pPr>
             <a:r>
-              <a:rPr lang="de-DE" dirty="0"/>
-              <a:t>T</a:t>
-            </a:r>
-            <a:r>
-              <a:rPr lang="de-ES"/>
-              <a:t>he agents dont respond to calls for ammo or medics if they do not come from their own team</a:t>
+              <a:rPr lang="de-ES" dirty="0"/>
+              <a:t>for fieldops cfa:</a:t>
+            </a:r>
+          </a:p>
+          <a:p>
+            <a:pPr marL="0" indent="0">
+              <a:buNone/>
+            </a:pPr>
+            <a:r>
+              <a:rPr lang="de-DE" b="1" dirty="0">
+                <a:latin typeface="Courier New" panose="02070309020205020404" pitchFamily="49" charset="0"/>
+                <a:cs typeface="Courier New" panose="02070309020205020404" pitchFamily="49" charset="0"/>
+              </a:rPr>
+              <a:t>+!</a:t>
+            </a:r>
+            <a:r>
+              <a:rPr lang="de-DE" b="1" dirty="0" err="1">
+                <a:latin typeface="Courier New" panose="02070309020205020404" pitchFamily="49" charset="0"/>
+                <a:cs typeface="Courier New" panose="02070309020205020404" pitchFamily="49" charset="0"/>
+              </a:rPr>
+              <a:t>checkAmmoAction</a:t>
+            </a:r>
+            <a:br>
+              <a:rPr lang="de-DE" b="1" dirty="0">
+                <a:latin typeface="Courier New" panose="02070309020205020404" pitchFamily="49" charset="0"/>
+                <a:cs typeface="Courier New" panose="02070309020205020404" pitchFamily="49" charset="0"/>
+              </a:rPr>
+            </a:br>
+            <a:r>
+              <a:rPr lang="de-DE" b="1" dirty="0">
+                <a:latin typeface="Courier New" panose="02070309020205020404" pitchFamily="49" charset="0"/>
+                <a:cs typeface="Courier New" panose="02070309020205020404" pitchFamily="49" charset="0"/>
+              </a:rPr>
+              <a:t>    &lt;-  ?</a:t>
+            </a:r>
+            <a:r>
+              <a:rPr lang="de-DE" b="1" dirty="0" err="1">
+                <a:latin typeface="Courier New" panose="02070309020205020404" pitchFamily="49" charset="0"/>
+                <a:cs typeface="Courier New" panose="02070309020205020404" pitchFamily="49" charset="0"/>
+              </a:rPr>
+              <a:t>cfa</a:t>
+            </a:r>
+            <a:r>
+              <a:rPr lang="de-DE" b="1" dirty="0">
+                <a:latin typeface="Courier New" panose="02070309020205020404" pitchFamily="49" charset="0"/>
+                <a:cs typeface="Courier New" panose="02070309020205020404" pitchFamily="49" charset="0"/>
+              </a:rPr>
+              <a:t>(</a:t>
+            </a:r>
+            <a:r>
+              <a:rPr lang="de-DE" b="1" dirty="0" err="1">
+                <a:latin typeface="Courier New" panose="02070309020205020404" pitchFamily="49" charset="0"/>
+                <a:cs typeface="Courier New" panose="02070309020205020404" pitchFamily="49" charset="0"/>
+              </a:rPr>
+              <a:t>Xcma</a:t>
+            </a:r>
+            <a:r>
+              <a:rPr lang="de-DE" b="1" dirty="0">
+                <a:latin typeface="Courier New" panose="02070309020205020404" pitchFamily="49" charset="0"/>
+                <a:cs typeface="Courier New" panose="02070309020205020404" pitchFamily="49" charset="0"/>
+              </a:rPr>
+              <a:t>, </a:t>
+            </a:r>
+            <a:r>
+              <a:rPr lang="de-DE" b="1" dirty="0" err="1">
+                <a:latin typeface="Courier New" panose="02070309020205020404" pitchFamily="49" charset="0"/>
+                <a:cs typeface="Courier New" panose="02070309020205020404" pitchFamily="49" charset="0"/>
+              </a:rPr>
+              <a:t>Ycma</a:t>
+            </a:r>
+            <a:r>
+              <a:rPr lang="de-DE" b="1" dirty="0">
+                <a:latin typeface="Courier New" panose="02070309020205020404" pitchFamily="49" charset="0"/>
+                <a:cs typeface="Courier New" panose="02070309020205020404" pitchFamily="49" charset="0"/>
+              </a:rPr>
+              <a:t>, </a:t>
+            </a:r>
+            <a:r>
+              <a:rPr lang="de-DE" b="1" dirty="0" err="1">
+                <a:latin typeface="Courier New" panose="02070309020205020404" pitchFamily="49" charset="0"/>
+                <a:cs typeface="Courier New" panose="02070309020205020404" pitchFamily="49" charset="0"/>
+              </a:rPr>
+              <a:t>Zcma</a:t>
+            </a:r>
+            <a:r>
+              <a:rPr lang="de-DE" b="1" dirty="0">
+                <a:latin typeface="Courier New" panose="02070309020205020404" pitchFamily="49" charset="0"/>
+                <a:cs typeface="Courier New" panose="02070309020205020404" pitchFamily="49" charset="0"/>
+              </a:rPr>
+              <a:t>, </a:t>
+            </a:r>
+            <a:r>
+              <a:rPr lang="de-DE" b="1" dirty="0" err="1">
+                <a:latin typeface="Courier New" panose="02070309020205020404" pitchFamily="49" charset="0"/>
+                <a:cs typeface="Courier New" panose="02070309020205020404" pitchFamily="49" charset="0"/>
+              </a:rPr>
+              <a:t>Ammocma</a:t>
+            </a:r>
+            <a:r>
+              <a:rPr lang="de-DE" b="1" dirty="0">
+                <a:latin typeface="Courier New" panose="02070309020205020404" pitchFamily="49" charset="0"/>
+                <a:cs typeface="Courier New" panose="02070309020205020404" pitchFamily="49" charset="0"/>
+              </a:rPr>
+              <a:t>)[</a:t>
+            </a:r>
+            <a:r>
+              <a:rPr lang="de-DE" b="1" dirty="0" err="1">
+                <a:latin typeface="Courier New" panose="02070309020205020404" pitchFamily="49" charset="0"/>
+                <a:cs typeface="Courier New" panose="02070309020205020404" pitchFamily="49" charset="0"/>
+              </a:rPr>
+              <a:t>source</a:t>
+            </a:r>
+            <a:r>
+              <a:rPr lang="de-DE" b="1" dirty="0">
+                <a:latin typeface="Courier New" panose="02070309020205020404" pitchFamily="49" charset="0"/>
+                <a:cs typeface="Courier New" panose="02070309020205020404" pitchFamily="49" charset="0"/>
+              </a:rPr>
+              <a:t>(</a:t>
+            </a:r>
+            <a:r>
+              <a:rPr lang="de-DE" b="1" dirty="0" err="1">
+                <a:latin typeface="Courier New" panose="02070309020205020404" pitchFamily="49" charset="0"/>
+                <a:cs typeface="Courier New" panose="02070309020205020404" pitchFamily="49" charset="0"/>
+              </a:rPr>
+              <a:t>Mcma</a:t>
+            </a:r>
+            <a:r>
+              <a:rPr lang="de-DE" b="1" dirty="0">
+                <a:latin typeface="Courier New" panose="02070309020205020404" pitchFamily="49" charset="0"/>
+                <a:cs typeface="Courier New" panose="02070309020205020404" pitchFamily="49" charset="0"/>
+              </a:rPr>
+              <a:t>)];</a:t>
+            </a:r>
+            <a:br>
+              <a:rPr lang="de-DE" b="1" dirty="0">
+                <a:latin typeface="Courier New" panose="02070309020205020404" pitchFamily="49" charset="0"/>
+                <a:cs typeface="Courier New" panose="02070309020205020404" pitchFamily="49" charset="0"/>
+              </a:rPr>
+            </a:br>
+            <a:r>
+              <a:rPr lang="de-DE" b="1" dirty="0">
+                <a:latin typeface="Courier New" panose="02070309020205020404" pitchFamily="49" charset="0"/>
+                <a:cs typeface="Courier New" panose="02070309020205020404" pitchFamily="49" charset="0"/>
+              </a:rPr>
+              <a:t>        </a:t>
+            </a:r>
+            <a:r>
+              <a:rPr lang="de-DE" b="1" dirty="0" err="1">
+                <a:latin typeface="Courier New" panose="02070309020205020404" pitchFamily="49" charset="0"/>
+                <a:cs typeface="Courier New" panose="02070309020205020404" pitchFamily="49" charset="0"/>
+              </a:rPr>
+              <a:t>if</a:t>
+            </a:r>
+            <a:r>
+              <a:rPr lang="de-DE" b="1" dirty="0">
+                <a:latin typeface="Courier New" panose="02070309020205020404" pitchFamily="49" charset="0"/>
+                <a:cs typeface="Courier New" panose="02070309020205020404" pitchFamily="49" charset="0"/>
+              </a:rPr>
+              <a:t> (</a:t>
+            </a:r>
+            <a:r>
+              <a:rPr lang="de-DE" b="1" dirty="0" err="1">
+                <a:latin typeface="Courier New" panose="02070309020205020404" pitchFamily="49" charset="0"/>
+                <a:cs typeface="Courier New" panose="02070309020205020404" pitchFamily="49" charset="0"/>
+              </a:rPr>
+              <a:t>Mcma</a:t>
+            </a:r>
+            <a:r>
+              <a:rPr lang="de-DE" b="1" dirty="0">
+                <a:latin typeface="Courier New" panose="02070309020205020404" pitchFamily="49" charset="0"/>
+                <a:cs typeface="Courier New" panose="02070309020205020404" pitchFamily="49" charset="0"/>
+              </a:rPr>
+              <a:t> == "T1" | </a:t>
+            </a:r>
+            <a:r>
+              <a:rPr lang="de-DE" b="1" dirty="0" err="1">
+                <a:latin typeface="Courier New" panose="02070309020205020404" pitchFamily="49" charset="0"/>
+                <a:cs typeface="Courier New" panose="02070309020205020404" pitchFamily="49" charset="0"/>
+              </a:rPr>
+              <a:t>Mcma</a:t>
+            </a:r>
+            <a:r>
+              <a:rPr lang="de-DE" b="1" dirty="0">
+                <a:latin typeface="Courier New" panose="02070309020205020404" pitchFamily="49" charset="0"/>
+                <a:cs typeface="Courier New" panose="02070309020205020404" pitchFamily="49" charset="0"/>
+              </a:rPr>
+              <a:t> == "T2" | </a:t>
+            </a:r>
+            <a:r>
+              <a:rPr lang="de-DE" b="1" dirty="0" err="1">
+                <a:latin typeface="Courier New" panose="02070309020205020404" pitchFamily="49" charset="0"/>
+                <a:cs typeface="Courier New" panose="02070309020205020404" pitchFamily="49" charset="0"/>
+              </a:rPr>
+              <a:t>Mcma</a:t>
+            </a:r>
+            <a:r>
+              <a:rPr lang="de-DE" b="1" dirty="0">
+                <a:latin typeface="Courier New" panose="02070309020205020404" pitchFamily="49" charset="0"/>
+                <a:cs typeface="Courier New" panose="02070309020205020404" pitchFamily="49" charset="0"/>
+              </a:rPr>
+              <a:t> == "T3" | </a:t>
+            </a:r>
+            <a:r>
+              <a:rPr lang="de-DE" b="1" dirty="0" err="1">
+                <a:latin typeface="Courier New" panose="02070309020205020404" pitchFamily="49" charset="0"/>
+                <a:cs typeface="Courier New" panose="02070309020205020404" pitchFamily="49" charset="0"/>
+              </a:rPr>
+              <a:t>Mcma</a:t>
+            </a:r>
+            <a:r>
+              <a:rPr lang="de-DE" b="1" dirty="0">
+                <a:latin typeface="Courier New" panose="02070309020205020404" pitchFamily="49" charset="0"/>
+                <a:cs typeface="Courier New" panose="02070309020205020404" pitchFamily="49" charset="0"/>
+              </a:rPr>
+              <a:t> == "T4" | </a:t>
+            </a:r>
+            <a:r>
+              <a:rPr lang="de-DE" b="1" dirty="0" err="1">
+                <a:latin typeface="Courier New" panose="02070309020205020404" pitchFamily="49" charset="0"/>
+                <a:cs typeface="Courier New" panose="02070309020205020404" pitchFamily="49" charset="0"/>
+              </a:rPr>
+              <a:t>Mcma</a:t>
+            </a:r>
+            <a:r>
+              <a:rPr lang="de-DE" b="1" dirty="0">
+                <a:latin typeface="Courier New" panose="02070309020205020404" pitchFamily="49" charset="0"/>
+                <a:cs typeface="Courier New" panose="02070309020205020404" pitchFamily="49" charset="0"/>
+              </a:rPr>
+              <a:t> == 		"T5" | </a:t>
+            </a:r>
+            <a:r>
+              <a:rPr lang="de-DE" b="1" dirty="0" err="1">
+                <a:latin typeface="Courier New" panose="02070309020205020404" pitchFamily="49" charset="0"/>
+                <a:cs typeface="Courier New" panose="02070309020205020404" pitchFamily="49" charset="0"/>
+              </a:rPr>
+              <a:t>Mcma</a:t>
+            </a:r>
+            <a:r>
+              <a:rPr lang="de-DE" b="1" dirty="0">
+                <a:latin typeface="Courier New" panose="02070309020205020404" pitchFamily="49" charset="0"/>
+                <a:cs typeface="Courier New" panose="02070309020205020404" pitchFamily="49" charset="0"/>
+              </a:rPr>
+              <a:t> == "T6" | </a:t>
+            </a:r>
+            <a:r>
+              <a:rPr lang="de-DE" b="1" dirty="0" err="1">
+                <a:latin typeface="Courier New" panose="02070309020205020404" pitchFamily="49" charset="0"/>
+                <a:cs typeface="Courier New" panose="02070309020205020404" pitchFamily="49" charset="0"/>
+              </a:rPr>
+              <a:t>Mcma</a:t>
+            </a:r>
+            <a:r>
+              <a:rPr lang="de-DE" b="1" dirty="0">
+                <a:latin typeface="Courier New" panose="02070309020205020404" pitchFamily="49" charset="0"/>
+                <a:cs typeface="Courier New" panose="02070309020205020404" pitchFamily="49" charset="0"/>
+              </a:rPr>
+              <a:t> == "T7") {</a:t>
+            </a:r>
+            <a:br>
+              <a:rPr lang="de-DE" b="1" dirty="0">
+                <a:latin typeface="Courier New" panose="02070309020205020404" pitchFamily="49" charset="0"/>
+                <a:cs typeface="Courier New" panose="02070309020205020404" pitchFamily="49" charset="0"/>
+              </a:rPr>
+            </a:br>
+            <a:r>
+              <a:rPr lang="de-DE" b="1" dirty="0">
+                <a:latin typeface="Courier New" panose="02070309020205020404" pitchFamily="49" charset="0"/>
+                <a:cs typeface="Courier New" panose="02070309020205020404" pitchFamily="49" charset="0"/>
+              </a:rPr>
+              <a:t>            -+</a:t>
+            </a:r>
+            <a:r>
+              <a:rPr lang="de-DE" b="1" dirty="0" err="1">
+                <a:latin typeface="Courier New" panose="02070309020205020404" pitchFamily="49" charset="0"/>
+                <a:cs typeface="Courier New" panose="02070309020205020404" pitchFamily="49" charset="0"/>
+              </a:rPr>
+              <a:t>fieldopsAction</a:t>
+            </a:r>
+            <a:r>
+              <a:rPr lang="de-DE" b="1" dirty="0">
+                <a:latin typeface="Courier New" panose="02070309020205020404" pitchFamily="49" charset="0"/>
+                <a:cs typeface="Courier New" panose="02070309020205020404" pitchFamily="49" charset="0"/>
+              </a:rPr>
+              <a:t>(on);</a:t>
+            </a:r>
+            <a:br>
+              <a:rPr lang="de-DE" b="1" dirty="0">
+                <a:latin typeface="Courier New" panose="02070309020205020404" pitchFamily="49" charset="0"/>
+                <a:cs typeface="Courier New" panose="02070309020205020404" pitchFamily="49" charset="0"/>
+              </a:rPr>
+            </a:br>
+            <a:r>
+              <a:rPr lang="de-DE" b="1" dirty="0">
+                <a:latin typeface="Courier New" panose="02070309020205020404" pitchFamily="49" charset="0"/>
+                <a:cs typeface="Courier New" panose="02070309020205020404" pitchFamily="49" charset="0"/>
+              </a:rPr>
+              <a:t>        } </a:t>
+            </a:r>
+            <a:r>
+              <a:rPr lang="de-DE" b="1" dirty="0" err="1">
+                <a:latin typeface="Courier New" panose="02070309020205020404" pitchFamily="49" charset="0"/>
+                <a:cs typeface="Courier New" panose="02070309020205020404" pitchFamily="49" charset="0"/>
+              </a:rPr>
+              <a:t>else</a:t>
+            </a:r>
+            <a:r>
+              <a:rPr lang="de-DE" b="1" dirty="0">
+                <a:latin typeface="Courier New" panose="02070309020205020404" pitchFamily="49" charset="0"/>
+                <a:cs typeface="Courier New" panose="02070309020205020404" pitchFamily="49" charset="0"/>
+              </a:rPr>
+              <a:t> {</a:t>
+            </a:r>
+            <a:br>
+              <a:rPr lang="de-DE" b="1" dirty="0">
+                <a:latin typeface="Courier New" panose="02070309020205020404" pitchFamily="49" charset="0"/>
+                <a:cs typeface="Courier New" panose="02070309020205020404" pitchFamily="49" charset="0"/>
+              </a:rPr>
+            </a:br>
+            <a:r>
+              <a:rPr lang="de-DE" b="1" dirty="0">
+                <a:latin typeface="Courier New" panose="02070309020205020404" pitchFamily="49" charset="0"/>
+                <a:cs typeface="Courier New" panose="02070309020205020404" pitchFamily="49" charset="0"/>
+              </a:rPr>
+              <a:t>            -+</a:t>
+            </a:r>
+            <a:r>
+              <a:rPr lang="de-DE" b="1" dirty="0" err="1">
+                <a:latin typeface="Courier New" panose="02070309020205020404" pitchFamily="49" charset="0"/>
+                <a:cs typeface="Courier New" panose="02070309020205020404" pitchFamily="49" charset="0"/>
+              </a:rPr>
+              <a:t>fieldopsAction</a:t>
+            </a:r>
+            <a:r>
+              <a:rPr lang="de-DE" b="1" dirty="0">
+                <a:latin typeface="Courier New" panose="02070309020205020404" pitchFamily="49" charset="0"/>
+                <a:cs typeface="Courier New" panose="02070309020205020404" pitchFamily="49" charset="0"/>
+              </a:rPr>
+              <a:t>(off);}.</a:t>
+            </a:r>
+            <a:endParaRPr lang="de-ES" b="1" dirty="0">
+              <a:latin typeface="Courier New" panose="02070309020205020404" pitchFamily="49" charset="0"/>
+              <a:cs typeface="Courier New" panose="02070309020205020404" pitchFamily="49" charset="0"/>
+            </a:endParaRPr>
+          </a:p>
+          <a:p>
+            <a:pPr marL="0" indent="0">
+              <a:buNone/>
+            </a:pPr>
+            <a:r>
+              <a:rPr lang="de-ES" dirty="0"/>
+              <a:t>Medics and fieldops are the only ones responding to cfm or cfa and only when it comes from their own team. For the other agents this is simply turned off.</a:t>
             </a:r>
           </a:p>
         </p:txBody>
@@ -6963,11 +7678,408 @@
               <a:buNone/>
             </a:pPr>
             <a:r>
-              <a:rPr lang="en-GB" dirty="0">
-                <a:cs typeface="Courier New" panose="02070309020205020404" pitchFamily="49" charset="0"/>
-              </a:rPr>
-              <a:t>//insert code here</a:t>
-            </a:r>
+              <a:rPr lang="de-DE" dirty="0">
+                <a:cs typeface="Courier New" panose="02070309020205020404" pitchFamily="49" charset="0"/>
+              </a:rPr>
+              <a:t>Inside </a:t>
+            </a:r>
+            <a:r>
+              <a:rPr lang="de-DE" dirty="0" err="1">
+                <a:cs typeface="Courier New" panose="02070309020205020404" pitchFamily="49" charset="0"/>
+              </a:rPr>
+              <a:t>perform_look_action</a:t>
+            </a:r>
+            <a:r>
+              <a:rPr lang="de-DE" dirty="0">
+                <a:cs typeface="Courier New" panose="02070309020205020404" pitchFamily="49" charset="0"/>
+              </a:rPr>
+              <a:t>:</a:t>
+            </a:r>
+          </a:p>
+          <a:p>
+            <a:pPr marL="0" indent="0">
+              <a:buNone/>
+            </a:pPr>
+            <a:r>
+              <a:rPr lang="de-DE" b="1" dirty="0" err="1">
+                <a:latin typeface="Courier New" panose="02070309020205020404" pitchFamily="49" charset="0"/>
+                <a:cs typeface="Courier New" panose="02070309020205020404" pitchFamily="49" charset="0"/>
+              </a:rPr>
+              <a:t>if</a:t>
+            </a:r>
+            <a:r>
+              <a:rPr lang="de-DE" b="1" dirty="0">
+                <a:latin typeface="Courier New" panose="02070309020205020404" pitchFamily="49" charset="0"/>
+                <a:cs typeface="Courier New" panose="02070309020205020404" pitchFamily="49" charset="0"/>
+              </a:rPr>
+              <a:t>(</a:t>
+            </a:r>
+            <a:r>
+              <a:rPr lang="de-DE" b="1" dirty="0" err="1">
+                <a:latin typeface="Courier New" panose="02070309020205020404" pitchFamily="49" charset="0"/>
+                <a:cs typeface="Courier New" panose="02070309020205020404" pitchFamily="49" charset="0"/>
+              </a:rPr>
+              <a:t>objectivePackTaken</a:t>
+            </a:r>
+            <a:r>
+              <a:rPr lang="de-DE" b="1" dirty="0">
+                <a:latin typeface="Courier New" panose="02070309020205020404" pitchFamily="49" charset="0"/>
+                <a:cs typeface="Courier New" panose="02070309020205020404" pitchFamily="49" charset="0"/>
+              </a:rPr>
+              <a:t>(on)){ </a:t>
+            </a:r>
+            <a:r>
+              <a:rPr lang="de-DE" dirty="0">
+                <a:latin typeface="Courier New" panose="02070309020205020404" pitchFamily="49" charset="0"/>
+                <a:cs typeface="Courier New" panose="02070309020205020404" pitchFamily="49" charset="0"/>
+              </a:rPr>
+              <a:t>//check </a:t>
+            </a:r>
+            <a:r>
+              <a:rPr lang="de-DE" dirty="0" err="1">
+                <a:latin typeface="Courier New" panose="02070309020205020404" pitchFamily="49" charset="0"/>
+                <a:cs typeface="Courier New" panose="02070309020205020404" pitchFamily="49" charset="0"/>
+              </a:rPr>
+              <a:t>if</a:t>
+            </a:r>
+            <a:r>
+              <a:rPr lang="de-DE" dirty="0">
+                <a:latin typeface="Courier New" panose="02070309020205020404" pitchFamily="49" charset="0"/>
+                <a:cs typeface="Courier New" panose="02070309020205020404" pitchFamily="49" charset="0"/>
+              </a:rPr>
+              <a:t> </a:t>
+            </a:r>
+            <a:r>
+              <a:rPr lang="de-DE" dirty="0" err="1">
+                <a:latin typeface="Courier New" panose="02070309020205020404" pitchFamily="49" charset="0"/>
+                <a:cs typeface="Courier New" panose="02070309020205020404" pitchFamily="49" charset="0"/>
+              </a:rPr>
+              <a:t>the</a:t>
+            </a:r>
+            <a:r>
+              <a:rPr lang="de-DE" dirty="0">
+                <a:latin typeface="Courier New" panose="02070309020205020404" pitchFamily="49" charset="0"/>
+                <a:cs typeface="Courier New" panose="02070309020205020404" pitchFamily="49" charset="0"/>
+              </a:rPr>
+              <a:t> </a:t>
+            </a:r>
+            <a:r>
+              <a:rPr lang="de-DE" dirty="0" err="1">
+                <a:latin typeface="Courier New" panose="02070309020205020404" pitchFamily="49" charset="0"/>
+                <a:cs typeface="Courier New" panose="02070309020205020404" pitchFamily="49" charset="0"/>
+              </a:rPr>
+              <a:t>flag</a:t>
+            </a:r>
+            <a:r>
+              <a:rPr lang="de-DE" dirty="0">
+                <a:latin typeface="Courier New" panose="02070309020205020404" pitchFamily="49" charset="0"/>
+                <a:cs typeface="Courier New" panose="02070309020205020404" pitchFamily="49" charset="0"/>
+              </a:rPr>
+              <a:t> </a:t>
+            </a:r>
+            <a:r>
+              <a:rPr lang="de-DE" dirty="0" err="1">
+                <a:latin typeface="Courier New" panose="02070309020205020404" pitchFamily="49" charset="0"/>
+                <a:cs typeface="Courier New" panose="02070309020205020404" pitchFamily="49" charset="0"/>
+              </a:rPr>
+              <a:t>is</a:t>
+            </a:r>
+            <a:r>
+              <a:rPr lang="de-DE" dirty="0">
+                <a:latin typeface="Courier New" panose="02070309020205020404" pitchFamily="49" charset="0"/>
+                <a:cs typeface="Courier New" panose="02070309020205020404" pitchFamily="49" charset="0"/>
+              </a:rPr>
+              <a:t> </a:t>
+            </a:r>
+            <a:r>
+              <a:rPr lang="de-DE" dirty="0" err="1">
+                <a:latin typeface="Courier New" panose="02070309020205020404" pitchFamily="49" charset="0"/>
+                <a:cs typeface="Courier New" panose="02070309020205020404" pitchFamily="49" charset="0"/>
+              </a:rPr>
+              <a:t>taken</a:t>
+            </a:r>
+            <a:br>
+              <a:rPr lang="de-DE" b="1" dirty="0">
+                <a:latin typeface="Courier New" panose="02070309020205020404" pitchFamily="49" charset="0"/>
+                <a:cs typeface="Courier New" panose="02070309020205020404" pitchFamily="49" charset="0"/>
+              </a:rPr>
+            </a:br>
+            <a:r>
+              <a:rPr lang="de-DE" b="1" dirty="0">
+                <a:latin typeface="Courier New" panose="02070309020205020404" pitchFamily="49" charset="0"/>
+                <a:cs typeface="Courier New" panose="02070309020205020404" pitchFamily="49" charset="0"/>
+              </a:rPr>
+              <a:t>    .</a:t>
+            </a:r>
+            <a:r>
+              <a:rPr lang="de-DE" b="1" dirty="0" err="1">
+                <a:latin typeface="Courier New" panose="02070309020205020404" pitchFamily="49" charset="0"/>
+                <a:cs typeface="Courier New" panose="02070309020205020404" pitchFamily="49" charset="0"/>
+              </a:rPr>
+              <a:t>println</a:t>
+            </a:r>
+            <a:r>
+              <a:rPr lang="de-DE" b="1" dirty="0">
+                <a:latin typeface="Courier New" panose="02070309020205020404" pitchFamily="49" charset="0"/>
+                <a:cs typeface="Courier New" panose="02070309020205020404" pitchFamily="49" charset="0"/>
+              </a:rPr>
+              <a:t>("</a:t>
+            </a:r>
+            <a:r>
+              <a:rPr lang="de-DE" b="1" dirty="0" err="1">
+                <a:latin typeface="Courier New" panose="02070309020205020404" pitchFamily="49" charset="0"/>
+                <a:cs typeface="Courier New" panose="02070309020205020404" pitchFamily="49" charset="0"/>
+              </a:rPr>
+              <a:t>Flag</a:t>
+            </a:r>
+            <a:r>
+              <a:rPr lang="de-DE" b="1" dirty="0">
+                <a:latin typeface="Courier New" panose="02070309020205020404" pitchFamily="49" charset="0"/>
+                <a:cs typeface="Courier New" panose="02070309020205020404" pitchFamily="49" charset="0"/>
+              </a:rPr>
+              <a:t> </a:t>
+            </a:r>
+            <a:r>
+              <a:rPr lang="de-DE" b="1" dirty="0" err="1">
+                <a:latin typeface="Courier New" panose="02070309020205020404" pitchFamily="49" charset="0"/>
+                <a:cs typeface="Courier New" panose="02070309020205020404" pitchFamily="49" charset="0"/>
+              </a:rPr>
+              <a:t>taken</a:t>
+            </a:r>
+            <a:r>
+              <a:rPr lang="de-DE" b="1" dirty="0">
+                <a:latin typeface="Courier New" panose="02070309020205020404" pitchFamily="49" charset="0"/>
+                <a:cs typeface="Courier New" panose="02070309020205020404" pitchFamily="49" charset="0"/>
+              </a:rPr>
+              <a:t>, </a:t>
+            </a:r>
+            <a:r>
+              <a:rPr lang="de-DE" b="1" dirty="0" err="1">
+                <a:latin typeface="Courier New" panose="02070309020205020404" pitchFamily="49" charset="0"/>
+                <a:cs typeface="Courier New" panose="02070309020205020404" pitchFamily="49" charset="0"/>
+              </a:rPr>
+              <a:t>calling</a:t>
+            </a:r>
+            <a:r>
+              <a:rPr lang="de-DE" b="1" dirty="0">
+                <a:latin typeface="Courier New" panose="02070309020205020404" pitchFamily="49" charset="0"/>
+                <a:cs typeface="Courier New" panose="02070309020205020404" pitchFamily="49" charset="0"/>
+              </a:rPr>
+              <a:t> </a:t>
+            </a:r>
+            <a:r>
+              <a:rPr lang="de-DE" b="1" dirty="0" err="1">
+                <a:latin typeface="Courier New" panose="02070309020205020404" pitchFamily="49" charset="0"/>
+                <a:cs typeface="Courier New" panose="02070309020205020404" pitchFamily="49" charset="0"/>
+              </a:rPr>
+              <a:t>for</a:t>
+            </a:r>
+            <a:r>
+              <a:rPr lang="de-DE" b="1" dirty="0">
+                <a:latin typeface="Courier New" panose="02070309020205020404" pitchFamily="49" charset="0"/>
+                <a:cs typeface="Courier New" panose="02070309020205020404" pitchFamily="49" charset="0"/>
+              </a:rPr>
+              <a:t> </a:t>
+            </a:r>
+            <a:r>
+              <a:rPr lang="de-DE" b="1" dirty="0" err="1">
+                <a:latin typeface="Courier New" panose="02070309020205020404" pitchFamily="49" charset="0"/>
+                <a:cs typeface="Courier New" panose="02070309020205020404" pitchFamily="49" charset="0"/>
+              </a:rPr>
+              <a:t>help</a:t>
+            </a:r>
+            <a:r>
+              <a:rPr lang="de-DE" b="1" dirty="0">
+                <a:latin typeface="Courier New" panose="02070309020205020404" pitchFamily="49" charset="0"/>
+                <a:cs typeface="Courier New" panose="02070309020205020404" pitchFamily="49" charset="0"/>
+              </a:rPr>
+              <a:t> ");</a:t>
+            </a:r>
+            <a:br>
+              <a:rPr lang="de-DE" b="1" dirty="0">
+                <a:latin typeface="Courier New" panose="02070309020205020404" pitchFamily="49" charset="0"/>
+                <a:cs typeface="Courier New" panose="02070309020205020404" pitchFamily="49" charset="0"/>
+              </a:rPr>
+            </a:br>
+            <a:r>
+              <a:rPr lang="de-DE" b="1" dirty="0">
+                <a:latin typeface="Courier New" panose="02070309020205020404" pitchFamily="49" charset="0"/>
+                <a:cs typeface="Courier New" panose="02070309020205020404" pitchFamily="49" charset="0"/>
+              </a:rPr>
+              <a:t>    ?</a:t>
+            </a:r>
+            <a:r>
+              <a:rPr lang="de-DE" b="1" dirty="0" err="1">
+                <a:latin typeface="Courier New" panose="02070309020205020404" pitchFamily="49" charset="0"/>
+                <a:cs typeface="Courier New" panose="02070309020205020404" pitchFamily="49" charset="0"/>
+              </a:rPr>
+              <a:t>my_position</a:t>
+            </a:r>
+            <a:r>
+              <a:rPr lang="de-DE" b="1" dirty="0">
+                <a:latin typeface="Courier New" panose="02070309020205020404" pitchFamily="49" charset="0"/>
+                <a:cs typeface="Courier New" panose="02070309020205020404" pitchFamily="49" charset="0"/>
+              </a:rPr>
+              <a:t>(X, Y, Z);</a:t>
+            </a:r>
+            <a:br>
+              <a:rPr lang="de-DE" b="1" dirty="0">
+                <a:latin typeface="Courier New" panose="02070309020205020404" pitchFamily="49" charset="0"/>
+                <a:cs typeface="Courier New" panose="02070309020205020404" pitchFamily="49" charset="0"/>
+              </a:rPr>
+            </a:br>
+            <a:r>
+              <a:rPr lang="de-DE" b="1" dirty="0">
+                <a:latin typeface="Courier New" panose="02070309020205020404" pitchFamily="49" charset="0"/>
+                <a:cs typeface="Courier New" panose="02070309020205020404" pitchFamily="49" charset="0"/>
+              </a:rPr>
+              <a:t>    .</a:t>
+            </a:r>
+            <a:r>
+              <a:rPr lang="de-DE" b="1" dirty="0" err="1">
+                <a:latin typeface="Courier New" panose="02070309020205020404" pitchFamily="49" charset="0"/>
+                <a:cs typeface="Courier New" panose="02070309020205020404" pitchFamily="49" charset="0"/>
+              </a:rPr>
+              <a:t>my_team</a:t>
+            </a:r>
+            <a:r>
+              <a:rPr lang="de-DE" b="1" dirty="0">
+                <a:latin typeface="Courier New" panose="02070309020205020404" pitchFamily="49" charset="0"/>
+                <a:cs typeface="Courier New" panose="02070309020205020404" pitchFamily="49" charset="0"/>
+              </a:rPr>
+              <a:t>("ALLIED", A);</a:t>
+            </a:r>
+            <a:br>
+              <a:rPr lang="de-DE" b="1" dirty="0">
+                <a:latin typeface="Courier New" panose="02070309020205020404" pitchFamily="49" charset="0"/>
+                <a:cs typeface="Courier New" panose="02070309020205020404" pitchFamily="49" charset="0"/>
+              </a:rPr>
+            </a:br>
+            <a:r>
+              <a:rPr lang="de-DE" b="1" dirty="0">
+                <a:latin typeface="Courier New" panose="02070309020205020404" pitchFamily="49" charset="0"/>
+                <a:cs typeface="Courier New" panose="02070309020205020404" pitchFamily="49" charset="0"/>
+              </a:rPr>
+              <a:t>    .</a:t>
+            </a:r>
+            <a:r>
+              <a:rPr lang="de-DE" b="1" dirty="0" err="1">
+                <a:latin typeface="Courier New" panose="02070309020205020404" pitchFamily="49" charset="0"/>
+                <a:cs typeface="Courier New" panose="02070309020205020404" pitchFamily="49" charset="0"/>
+              </a:rPr>
+              <a:t>concat</a:t>
+            </a:r>
+            <a:r>
+              <a:rPr lang="de-DE" b="1" dirty="0">
+                <a:latin typeface="Courier New" panose="02070309020205020404" pitchFamily="49" charset="0"/>
+                <a:cs typeface="Courier New" panose="02070309020205020404" pitchFamily="49" charset="0"/>
+              </a:rPr>
+              <a:t>("</a:t>
+            </a:r>
+            <a:r>
+              <a:rPr lang="de-DE" b="1" dirty="0" err="1">
+                <a:latin typeface="Courier New" panose="02070309020205020404" pitchFamily="49" charset="0"/>
+                <a:cs typeface="Courier New" panose="02070309020205020404" pitchFamily="49" charset="0"/>
+              </a:rPr>
+              <a:t>cfh</a:t>
+            </a:r>
+            <a:r>
+              <a:rPr lang="de-DE" b="1" dirty="0">
+                <a:latin typeface="Courier New" panose="02070309020205020404" pitchFamily="49" charset="0"/>
+                <a:cs typeface="Courier New" panose="02070309020205020404" pitchFamily="49" charset="0"/>
+              </a:rPr>
+              <a:t>(", X, ", ", Y, ", ", Z, ", ", 20, ")", </a:t>
+            </a:r>
+            <a:r>
+              <a:rPr lang="de-DE" b="1" dirty="0" err="1">
+                <a:latin typeface="Courier New" panose="02070309020205020404" pitchFamily="49" charset="0"/>
+                <a:cs typeface="Courier New" panose="02070309020205020404" pitchFamily="49" charset="0"/>
+              </a:rPr>
+              <a:t>FTHelp</a:t>
+            </a:r>
+            <a:r>
+              <a:rPr lang="de-DE" b="1" dirty="0">
+                <a:latin typeface="Courier New" panose="02070309020205020404" pitchFamily="49" charset="0"/>
+                <a:cs typeface="Courier New" panose="02070309020205020404" pitchFamily="49" charset="0"/>
+              </a:rPr>
+              <a:t>);</a:t>
+            </a:r>
+            <a:br>
+              <a:rPr lang="de-DE" b="1" dirty="0">
+                <a:latin typeface="Courier New" panose="02070309020205020404" pitchFamily="49" charset="0"/>
+                <a:cs typeface="Courier New" panose="02070309020205020404" pitchFamily="49" charset="0"/>
+              </a:rPr>
+            </a:br>
+            <a:r>
+              <a:rPr lang="de-DE" b="1" dirty="0">
+                <a:latin typeface="Courier New" panose="02070309020205020404" pitchFamily="49" charset="0"/>
+                <a:cs typeface="Courier New" panose="02070309020205020404" pitchFamily="49" charset="0"/>
+              </a:rPr>
+              <a:t>    .</a:t>
+            </a:r>
+            <a:r>
+              <a:rPr lang="de-DE" b="1" dirty="0" err="1">
+                <a:latin typeface="Courier New" panose="02070309020205020404" pitchFamily="49" charset="0"/>
+                <a:cs typeface="Courier New" panose="02070309020205020404" pitchFamily="49" charset="0"/>
+              </a:rPr>
+              <a:t>send_msg_with_conversation_id</a:t>
+            </a:r>
+            <a:r>
+              <a:rPr lang="de-DE" b="1" dirty="0">
+                <a:latin typeface="Courier New" panose="02070309020205020404" pitchFamily="49" charset="0"/>
+                <a:cs typeface="Courier New" panose="02070309020205020404" pitchFamily="49" charset="0"/>
+              </a:rPr>
+              <a:t>(A, </a:t>
+            </a:r>
+            <a:r>
+              <a:rPr lang="de-DE" b="1" dirty="0" err="1">
+                <a:latin typeface="Courier New" panose="02070309020205020404" pitchFamily="49" charset="0"/>
+                <a:cs typeface="Courier New" panose="02070309020205020404" pitchFamily="49" charset="0"/>
+              </a:rPr>
+              <a:t>tell</a:t>
+            </a:r>
+            <a:r>
+              <a:rPr lang="de-DE" b="1" dirty="0">
+                <a:latin typeface="Courier New" panose="02070309020205020404" pitchFamily="49" charset="0"/>
+                <a:cs typeface="Courier New" panose="02070309020205020404" pitchFamily="49" charset="0"/>
+              </a:rPr>
+              <a:t>, </a:t>
+            </a:r>
+            <a:r>
+              <a:rPr lang="de-DE" b="1" dirty="0" err="1">
+                <a:latin typeface="Courier New" panose="02070309020205020404" pitchFamily="49" charset="0"/>
+                <a:cs typeface="Courier New" panose="02070309020205020404" pitchFamily="49" charset="0"/>
+              </a:rPr>
+              <a:t>FTHelp</a:t>
+            </a:r>
+            <a:r>
+              <a:rPr lang="de-DE" b="1" dirty="0">
+                <a:latin typeface="Courier New" panose="02070309020205020404" pitchFamily="49" charset="0"/>
+                <a:cs typeface="Courier New" panose="02070309020205020404" pitchFamily="49" charset="0"/>
+              </a:rPr>
+              <a:t>, "CFH");</a:t>
+            </a:r>
+            <a:br>
+              <a:rPr lang="de-DE" b="1" dirty="0">
+                <a:latin typeface="Courier New" panose="02070309020205020404" pitchFamily="49" charset="0"/>
+                <a:cs typeface="Courier New" panose="02070309020205020404" pitchFamily="49" charset="0"/>
+              </a:rPr>
+            </a:br>
+            <a:r>
+              <a:rPr lang="de-DE" b="1" dirty="0">
+                <a:latin typeface="Courier New" panose="02070309020205020404" pitchFamily="49" charset="0"/>
+                <a:cs typeface="Courier New" panose="02070309020205020404" pitchFamily="49" charset="0"/>
+              </a:rPr>
+              <a:t>  }</a:t>
+            </a:r>
+          </a:p>
+          <a:p>
+            <a:pPr marL="0" indent="0">
+              <a:buNone/>
+            </a:pPr>
+            <a:endParaRPr lang="de-DE" dirty="0">
+              <a:cs typeface="Courier New" panose="02070309020205020404" pitchFamily="49" charset="0"/>
+            </a:endParaRPr>
           </a:p>
           <a:p>
             <a:pPr marL="0" indent="0">
@@ -7029,92 +8141,6 @@
           <p:cNvPr id="2" name="Titel 1">
             <a:extLst>
               <a:ext uri="{FF2B5EF4-FFF2-40B4-BE49-F238E27FC236}">
-                <a16:creationId xmlns:a16="http://schemas.microsoft.com/office/drawing/2014/main" id="{F65C6C72-1022-B54C-845D-9F80026E2E35}"/>
-              </a:ext>
-            </a:extLst>
-          </p:cNvPr>
-          <p:cNvSpPr>
-            <a:spLocks noGrp="1"/>
-          </p:cNvSpPr>
-          <p:nvPr>
-            <p:ph type="title"/>
-          </p:nvPr>
-        </p:nvSpPr>
-        <p:spPr/>
-        <p:txBody>
-          <a:bodyPr/>
-          <a:lstStyle/>
-          <a:p>
-            <a:r>
-              <a:rPr lang="de-ES" dirty="0"/>
-              <a:t>Axis: decrease patroling radius</a:t>
-            </a:r>
-          </a:p>
-        </p:txBody>
-      </p:sp>
-      <p:sp>
-        <p:nvSpPr>
-          <p:cNvPr id="3" name="Inhaltsplatzhalter 2">
-            <a:extLst>
-              <a:ext uri="{FF2B5EF4-FFF2-40B4-BE49-F238E27FC236}">
-                <a16:creationId xmlns:a16="http://schemas.microsoft.com/office/drawing/2014/main" id="{B0878969-B8F4-C441-9BF7-A58CD84CAE35}"/>
-              </a:ext>
-            </a:extLst>
-          </p:cNvPr>
-          <p:cNvSpPr>
-            <a:spLocks noGrp="1"/>
-          </p:cNvSpPr>
-          <p:nvPr>
-            <p:ph idx="1"/>
-          </p:nvPr>
-        </p:nvSpPr>
-        <p:spPr/>
-        <p:txBody>
-          <a:bodyPr/>
-          <a:lstStyle/>
-          <a:p>
-            <a:pPr marL="0" indent="0">
-              <a:buNone/>
-            </a:pPr>
-            <a:endParaRPr lang="de-ES" dirty="0"/>
-          </a:p>
-        </p:txBody>
-      </p:sp>
-    </p:spTree>
-    <p:extLst>
-      <p:ext uri="{BB962C8B-B14F-4D97-AF65-F5344CB8AC3E}">
-        <p14:creationId xmlns:p14="http://schemas.microsoft.com/office/powerpoint/2010/main" val="1295146807"/>
-      </p:ext>
-    </p:extLst>
-  </p:cSld>
-  <p:clrMapOvr>
-    <a:masterClrMapping/>
-  </p:clrMapOvr>
-</p:sld>
-</file>
-
-<file path=ppt/slides/slide7.xml><?xml version="1.0" encoding="utf-8"?>
-<p:sld xmlns:a="http://schemas.openxmlformats.org/drawingml/2006/main" xmlns:r="http://schemas.openxmlformats.org/officeDocument/2006/relationships" xmlns:p="http://schemas.openxmlformats.org/presentationml/2006/main">
-  <p:cSld>
-    <p:spTree>
-      <p:nvGrpSpPr>
-        <p:cNvPr id="1" name=""/>
-        <p:cNvGrpSpPr/>
-        <p:nvPr/>
-      </p:nvGrpSpPr>
-      <p:grpSpPr>
-        <a:xfrm>
-          <a:off x="0" y="0"/>
-          <a:ext cx="0" cy="0"/>
-          <a:chOff x="0" y="0"/>
-          <a:chExt cx="0" cy="0"/>
-        </a:xfrm>
-      </p:grpSpPr>
-      <p:sp>
-        <p:nvSpPr>
-          <p:cNvPr id="2" name="Titel 1">
-            <a:extLst>
-              <a:ext uri="{FF2B5EF4-FFF2-40B4-BE49-F238E27FC236}">
                 <a16:creationId xmlns:a16="http://schemas.microsoft.com/office/drawing/2014/main" id="{B2DAE85F-FCF8-E44D-837D-FECA1589E7E6}"/>
               </a:ext>
             </a:extLst>
@@ -7154,15 +8180,1758 @@
             <p:ph idx="1"/>
           </p:nvPr>
         </p:nvSpPr>
-        <p:spPr/>
-        <p:txBody>
-          <a:bodyPr/>
+        <p:spPr>
+          <a:xfrm>
+            <a:off x="677334" y="1728592"/>
+            <a:ext cx="8596668" cy="4519809"/>
+          </a:xfrm>
+        </p:spPr>
+        <p:txBody>
+          <a:bodyPr>
+            <a:normAutofit fontScale="85000" lnSpcReduction="10000"/>
+          </a:bodyPr>
           <a:lstStyle/>
           <a:p>
             <a:pPr marL="0" indent="0">
               <a:buNone/>
             </a:pPr>
-            <a:endParaRPr lang="de-ES" dirty="0"/>
+            <a:r>
+              <a:rPr lang="de-DE" sz="1600" dirty="0">
+                <a:latin typeface="Courier New" panose="02070309020205020404" pitchFamily="49" charset="0"/>
+                <a:cs typeface="Courier New" panose="02070309020205020404" pitchFamily="49" charset="0"/>
+              </a:rPr>
+              <a:t>//</a:t>
+            </a:r>
+            <a:r>
+              <a:rPr lang="de-DE" sz="1600" dirty="0" err="1">
+                <a:latin typeface="Courier New" panose="02070309020205020404" pitchFamily="49" charset="0"/>
+                <a:cs typeface="Courier New" panose="02070309020205020404" pitchFamily="49" charset="0"/>
+              </a:rPr>
+              <a:t>Strategy</a:t>
+            </a:r>
+            <a:r>
+              <a:rPr lang="de-DE" sz="1600" dirty="0">
+                <a:latin typeface="Courier New" panose="02070309020205020404" pitchFamily="49" charset="0"/>
+                <a:cs typeface="Courier New" panose="02070309020205020404" pitchFamily="49" charset="0"/>
+              </a:rPr>
+              <a:t>: follow </a:t>
+            </a:r>
+            <a:r>
+              <a:rPr lang="de-DE" sz="1600" dirty="0" err="1">
+                <a:latin typeface="Courier New" panose="02070309020205020404" pitchFamily="49" charset="0"/>
+                <a:cs typeface="Courier New" panose="02070309020205020404" pitchFamily="49" charset="0"/>
+              </a:rPr>
+              <a:t>the</a:t>
+            </a:r>
+            <a:r>
+              <a:rPr lang="de-DE" sz="1600" dirty="0">
+                <a:latin typeface="Courier New" panose="02070309020205020404" pitchFamily="49" charset="0"/>
+                <a:cs typeface="Courier New" panose="02070309020205020404" pitchFamily="49" charset="0"/>
+              </a:rPr>
+              <a:t> </a:t>
+            </a:r>
+            <a:r>
+              <a:rPr lang="de-DE" sz="1600" dirty="0" err="1">
+                <a:latin typeface="Courier New" panose="02070309020205020404" pitchFamily="49" charset="0"/>
+                <a:cs typeface="Courier New" panose="02070309020205020404" pitchFamily="49" charset="0"/>
+              </a:rPr>
+              <a:t>enemy</a:t>
+            </a:r>
+            <a:r>
+              <a:rPr lang="de-DE" sz="1600" dirty="0">
+                <a:latin typeface="Courier New" panose="02070309020205020404" pitchFamily="49" charset="0"/>
+                <a:cs typeface="Courier New" panose="02070309020205020404" pitchFamily="49" charset="0"/>
+              </a:rPr>
+              <a:t> </a:t>
+            </a:r>
+            <a:r>
+              <a:rPr lang="de-DE" sz="1600" dirty="0" err="1">
+                <a:latin typeface="Courier New" panose="02070309020205020404" pitchFamily="49" charset="0"/>
+                <a:cs typeface="Courier New" panose="02070309020205020404" pitchFamily="49" charset="0"/>
+              </a:rPr>
+              <a:t>and</a:t>
+            </a:r>
+            <a:r>
+              <a:rPr lang="de-DE" sz="1600" dirty="0">
+                <a:latin typeface="Courier New" panose="02070309020205020404" pitchFamily="49" charset="0"/>
+                <a:cs typeface="Courier New" panose="02070309020205020404" pitchFamily="49" charset="0"/>
+              </a:rPr>
+              <a:t> </a:t>
+            </a:r>
+            <a:r>
+              <a:rPr lang="de-DE" sz="1600" dirty="0" err="1">
+                <a:latin typeface="Courier New" panose="02070309020205020404" pitchFamily="49" charset="0"/>
+                <a:cs typeface="Courier New" panose="02070309020205020404" pitchFamily="49" charset="0"/>
+              </a:rPr>
+              <a:t>the</a:t>
+            </a:r>
+            <a:r>
+              <a:rPr lang="de-DE" sz="1600" dirty="0">
+                <a:latin typeface="Courier New" panose="02070309020205020404" pitchFamily="49" charset="0"/>
+                <a:cs typeface="Courier New" panose="02070309020205020404" pitchFamily="49" charset="0"/>
+              </a:rPr>
+              <a:t> </a:t>
+            </a:r>
+            <a:r>
+              <a:rPr lang="de-DE" sz="1600" dirty="0" err="1">
+                <a:latin typeface="Courier New" panose="02070309020205020404" pitchFamily="49" charset="0"/>
+                <a:cs typeface="Courier New" panose="02070309020205020404" pitchFamily="49" charset="0"/>
+              </a:rPr>
+              <a:t>enemy</a:t>
+            </a:r>
+            <a:r>
+              <a:rPr lang="de-DE" sz="1600" dirty="0">
+                <a:latin typeface="Courier New" panose="02070309020205020404" pitchFamily="49" charset="0"/>
+                <a:cs typeface="Courier New" panose="02070309020205020404" pitchFamily="49" charset="0"/>
+              </a:rPr>
+              <a:t> </a:t>
+            </a:r>
+            <a:r>
+              <a:rPr lang="de-DE" sz="1600" dirty="0" err="1">
+                <a:latin typeface="Courier New" panose="02070309020205020404" pitchFamily="49" charset="0"/>
+                <a:cs typeface="Courier New" panose="02070309020205020404" pitchFamily="49" charset="0"/>
+              </a:rPr>
+              <a:t>with</a:t>
+            </a:r>
+            <a:r>
+              <a:rPr lang="de-DE" sz="1600" dirty="0">
+                <a:latin typeface="Courier New" panose="02070309020205020404" pitchFamily="49" charset="0"/>
+                <a:cs typeface="Courier New" panose="02070309020205020404" pitchFamily="49" charset="0"/>
+              </a:rPr>
+              <a:t> </a:t>
+            </a:r>
+            <a:r>
+              <a:rPr lang="de-DE" sz="1600" dirty="0" err="1">
+                <a:latin typeface="Courier New" panose="02070309020205020404" pitchFamily="49" charset="0"/>
+                <a:cs typeface="Courier New" panose="02070309020205020404" pitchFamily="49" charset="0"/>
+              </a:rPr>
+              <a:t>the</a:t>
+            </a:r>
+            <a:r>
+              <a:rPr lang="de-DE" sz="1600" dirty="0">
+                <a:latin typeface="Courier New" panose="02070309020205020404" pitchFamily="49" charset="0"/>
+                <a:cs typeface="Courier New" panose="02070309020205020404" pitchFamily="49" charset="0"/>
+              </a:rPr>
+              <a:t> </a:t>
+            </a:r>
+            <a:r>
+              <a:rPr lang="de-DE" sz="1600" dirty="0" err="1">
+                <a:latin typeface="Courier New" panose="02070309020205020404" pitchFamily="49" charset="0"/>
+                <a:cs typeface="Courier New" panose="02070309020205020404" pitchFamily="49" charset="0"/>
+              </a:rPr>
+              <a:t>flag</a:t>
+            </a:r>
+            <a:r>
+              <a:rPr lang="de-DE" sz="1600" dirty="0">
+                <a:latin typeface="Courier New" panose="02070309020205020404" pitchFamily="49" charset="0"/>
+                <a:cs typeface="Courier New" panose="02070309020205020404" pitchFamily="49" charset="0"/>
+              </a:rPr>
+              <a:t> </a:t>
+            </a:r>
+            <a:r>
+              <a:rPr lang="de-DE" sz="1600" dirty="0" err="1">
+                <a:latin typeface="Courier New" panose="02070309020205020404" pitchFamily="49" charset="0"/>
+                <a:cs typeface="Courier New" panose="02070309020205020404" pitchFamily="49" charset="0"/>
+              </a:rPr>
+              <a:t>and</a:t>
+            </a:r>
+            <a:r>
+              <a:rPr lang="de-DE" sz="1600" dirty="0">
+                <a:latin typeface="Courier New" panose="02070309020205020404" pitchFamily="49" charset="0"/>
+                <a:cs typeface="Courier New" panose="02070309020205020404" pitchFamily="49" charset="0"/>
+              </a:rPr>
+              <a:t> </a:t>
+            </a:r>
+            <a:r>
+              <a:rPr lang="de-DE" sz="1600" dirty="0" err="1">
+                <a:latin typeface="Courier New" panose="02070309020205020404" pitchFamily="49" charset="0"/>
+                <a:cs typeface="Courier New" panose="02070309020205020404" pitchFamily="49" charset="0"/>
+              </a:rPr>
+              <a:t>take</a:t>
+            </a:r>
+            <a:r>
+              <a:rPr lang="de-DE" sz="1600" dirty="0">
+                <a:latin typeface="Courier New" panose="02070309020205020404" pitchFamily="49" charset="0"/>
+                <a:cs typeface="Courier New" panose="02070309020205020404" pitchFamily="49" charset="0"/>
+              </a:rPr>
+              <a:t> </a:t>
+            </a:r>
+            <a:r>
+              <a:rPr lang="de-DE" sz="1600" dirty="0" err="1">
+                <a:latin typeface="Courier New" panose="02070309020205020404" pitchFamily="49" charset="0"/>
+                <a:cs typeface="Courier New" panose="02070309020205020404" pitchFamily="49" charset="0"/>
+              </a:rPr>
+              <a:t>the</a:t>
+            </a:r>
+            <a:r>
+              <a:rPr lang="de-DE" sz="1600" dirty="0">
+                <a:latin typeface="Courier New" panose="02070309020205020404" pitchFamily="49" charset="0"/>
+                <a:cs typeface="Courier New" panose="02070309020205020404" pitchFamily="49" charset="0"/>
+              </a:rPr>
+              <a:t> </a:t>
+            </a:r>
+            <a:r>
+              <a:rPr lang="de-DE" sz="1600" dirty="0" err="1">
+                <a:latin typeface="Courier New" panose="02070309020205020404" pitchFamily="49" charset="0"/>
+                <a:cs typeface="Courier New" panose="02070309020205020404" pitchFamily="49" charset="0"/>
+              </a:rPr>
+              <a:t>flag</a:t>
+            </a:r>
+            <a:br>
+              <a:rPr lang="de-DE" sz="1600" b="1" dirty="0">
+                <a:latin typeface="Courier New" panose="02070309020205020404" pitchFamily="49" charset="0"/>
+                <a:cs typeface="Courier New" panose="02070309020205020404" pitchFamily="49" charset="0"/>
+              </a:rPr>
+            </a:br>
+            <a:r>
+              <a:rPr lang="de-DE" sz="1600" b="1" dirty="0">
+                <a:latin typeface="Courier New" panose="02070309020205020404" pitchFamily="49" charset="0"/>
+                <a:cs typeface="Courier New" panose="02070309020205020404" pitchFamily="49" charset="0"/>
+              </a:rPr>
+              <a:t>+</a:t>
+            </a:r>
+            <a:r>
+              <a:rPr lang="de-DE" sz="1600" b="1" dirty="0" err="1">
+                <a:latin typeface="Courier New" panose="02070309020205020404" pitchFamily="49" charset="0"/>
+                <a:cs typeface="Courier New" panose="02070309020205020404" pitchFamily="49" charset="0"/>
+              </a:rPr>
+              <a:t>prio</a:t>
+            </a:r>
+            <a:r>
+              <a:rPr lang="de-DE" sz="1600" b="1" dirty="0">
+                <a:latin typeface="Courier New" panose="02070309020205020404" pitchFamily="49" charset="0"/>
+                <a:cs typeface="Courier New" panose="02070309020205020404" pitchFamily="49" charset="0"/>
+              </a:rPr>
+              <a:t>(10000);</a:t>
+            </a:r>
+            <a:r>
+              <a:rPr lang="de-DE" sz="1600" dirty="0">
+                <a:latin typeface="Courier New" panose="02070309020205020404" pitchFamily="49" charset="0"/>
+                <a:cs typeface="Courier New" panose="02070309020205020404" pitchFamily="49" charset="0"/>
+              </a:rPr>
+              <a:t>//Create </a:t>
+            </a:r>
+            <a:r>
+              <a:rPr lang="de-DE" sz="1600" dirty="0" err="1">
+                <a:latin typeface="Courier New" panose="02070309020205020404" pitchFamily="49" charset="0"/>
+                <a:cs typeface="Courier New" panose="02070309020205020404" pitchFamily="49" charset="0"/>
+              </a:rPr>
+              <a:t>priority</a:t>
+            </a:r>
+            <a:r>
+              <a:rPr lang="de-DE" sz="1600" dirty="0">
+                <a:latin typeface="Courier New" panose="02070309020205020404" pitchFamily="49" charset="0"/>
+                <a:cs typeface="Courier New" panose="02070309020205020404" pitchFamily="49" charset="0"/>
+              </a:rPr>
+              <a:t> </a:t>
+            </a:r>
+            <a:r>
+              <a:rPr lang="de-DE" sz="1600" dirty="0" err="1">
+                <a:latin typeface="Courier New" panose="02070309020205020404" pitchFamily="49" charset="0"/>
+                <a:cs typeface="Courier New" panose="02070309020205020404" pitchFamily="49" charset="0"/>
+              </a:rPr>
+              <a:t>for</a:t>
+            </a:r>
+            <a:r>
+              <a:rPr lang="de-DE" sz="1600" dirty="0">
+                <a:latin typeface="Courier New" panose="02070309020205020404" pitchFamily="49" charset="0"/>
+                <a:cs typeface="Courier New" panose="02070309020205020404" pitchFamily="49" charset="0"/>
+              </a:rPr>
+              <a:t> </a:t>
+            </a:r>
+            <a:r>
+              <a:rPr lang="de-DE" sz="1600" dirty="0" err="1">
+                <a:latin typeface="Courier New" panose="02070309020205020404" pitchFamily="49" charset="0"/>
+                <a:cs typeface="Courier New" panose="02070309020205020404" pitchFamily="49" charset="0"/>
+              </a:rPr>
+              <a:t>the</a:t>
+            </a:r>
+            <a:r>
+              <a:rPr lang="de-DE" sz="1600" dirty="0">
+                <a:latin typeface="Courier New" panose="02070309020205020404" pitchFamily="49" charset="0"/>
+                <a:cs typeface="Courier New" panose="02070309020205020404" pitchFamily="49" charset="0"/>
+              </a:rPr>
+              <a:t> </a:t>
+            </a:r>
+            <a:r>
+              <a:rPr lang="de-DE" sz="1600" dirty="0" err="1">
+                <a:latin typeface="Courier New" panose="02070309020205020404" pitchFamily="49" charset="0"/>
+                <a:cs typeface="Courier New" panose="02070309020205020404" pitchFamily="49" charset="0"/>
+              </a:rPr>
+              <a:t>pursue</a:t>
+            </a:r>
+            <a:r>
+              <a:rPr lang="de-DE" sz="1600" dirty="0">
+                <a:latin typeface="Courier New" panose="02070309020205020404" pitchFamily="49" charset="0"/>
+                <a:cs typeface="Courier New" panose="02070309020205020404" pitchFamily="49" charset="0"/>
+              </a:rPr>
+              <a:t> </a:t>
+            </a:r>
+            <a:r>
+              <a:rPr lang="de-DE" sz="1600" dirty="0" err="1">
+                <a:latin typeface="Courier New" panose="02070309020205020404" pitchFamily="49" charset="0"/>
+                <a:cs typeface="Courier New" panose="02070309020205020404" pitchFamily="49" charset="0"/>
+              </a:rPr>
+              <a:t>of</a:t>
+            </a:r>
+            <a:r>
+              <a:rPr lang="de-DE" sz="1600" dirty="0">
+                <a:latin typeface="Courier New" panose="02070309020205020404" pitchFamily="49" charset="0"/>
+                <a:cs typeface="Courier New" panose="02070309020205020404" pitchFamily="49" charset="0"/>
+              </a:rPr>
+              <a:t> </a:t>
+            </a:r>
+            <a:r>
+              <a:rPr lang="de-DE" sz="1600" dirty="0" err="1">
+                <a:latin typeface="Courier New" panose="02070309020205020404" pitchFamily="49" charset="0"/>
+                <a:cs typeface="Courier New" panose="02070309020205020404" pitchFamily="49" charset="0"/>
+              </a:rPr>
+              <a:t>the</a:t>
+            </a:r>
+            <a:r>
+              <a:rPr lang="de-DE" sz="1600" dirty="0">
+                <a:latin typeface="Courier New" panose="02070309020205020404" pitchFamily="49" charset="0"/>
+                <a:cs typeface="Courier New" panose="02070309020205020404" pitchFamily="49" charset="0"/>
+              </a:rPr>
+              <a:t> </a:t>
+            </a:r>
+            <a:r>
+              <a:rPr lang="de-DE" sz="1600" dirty="0" err="1">
+                <a:latin typeface="Courier New" panose="02070309020205020404" pitchFamily="49" charset="0"/>
+                <a:cs typeface="Courier New" panose="02070309020205020404" pitchFamily="49" charset="0"/>
+              </a:rPr>
+              <a:t>enemy</a:t>
+            </a:r>
+            <a:br>
+              <a:rPr lang="de-DE" sz="1600" b="1" dirty="0">
+                <a:latin typeface="Courier New" panose="02070309020205020404" pitchFamily="49" charset="0"/>
+                <a:cs typeface="Courier New" panose="02070309020205020404" pitchFamily="49" charset="0"/>
+              </a:rPr>
+            </a:br>
+            <a:br>
+              <a:rPr lang="de-DE" sz="1600" b="1" dirty="0">
+                <a:latin typeface="Courier New" panose="02070309020205020404" pitchFamily="49" charset="0"/>
+                <a:cs typeface="Courier New" panose="02070309020205020404" pitchFamily="49" charset="0"/>
+              </a:rPr>
+            </a:br>
+            <a:r>
+              <a:rPr lang="de-DE" sz="1600" b="1" dirty="0" err="1">
+                <a:latin typeface="Courier New" panose="02070309020205020404" pitchFamily="49" charset="0"/>
+                <a:cs typeface="Courier New" panose="02070309020205020404" pitchFamily="49" charset="0"/>
+              </a:rPr>
+              <a:t>if</a:t>
+            </a:r>
+            <a:r>
+              <a:rPr lang="de-DE" sz="1600" b="1" dirty="0">
+                <a:latin typeface="Courier New" panose="02070309020205020404" pitchFamily="49" charset="0"/>
+                <a:cs typeface="Courier New" panose="02070309020205020404" pitchFamily="49" charset="0"/>
+              </a:rPr>
+              <a:t> (</a:t>
+            </a:r>
+            <a:r>
+              <a:rPr lang="de-DE" sz="1600" b="1" dirty="0" err="1">
+                <a:latin typeface="Courier New" panose="02070309020205020404" pitchFamily="49" charset="0"/>
+                <a:cs typeface="Courier New" panose="02070309020205020404" pitchFamily="49" charset="0"/>
+              </a:rPr>
+              <a:t>AimedAgentTeam</a:t>
+            </a:r>
+            <a:r>
+              <a:rPr lang="de-DE" sz="1600" b="1" dirty="0">
+                <a:latin typeface="Courier New" panose="02070309020205020404" pitchFamily="49" charset="0"/>
+                <a:cs typeface="Courier New" panose="02070309020205020404" pitchFamily="49" charset="0"/>
+              </a:rPr>
+              <a:t> == 1003 | </a:t>
+            </a:r>
+            <a:r>
+              <a:rPr lang="de-DE" sz="1600" b="1" dirty="0" err="1">
+                <a:latin typeface="Courier New" panose="02070309020205020404" pitchFamily="49" charset="0"/>
+                <a:cs typeface="Courier New" panose="02070309020205020404" pitchFamily="49" charset="0"/>
+              </a:rPr>
+              <a:t>AimedAgentTeam</a:t>
+            </a:r>
+            <a:r>
+              <a:rPr lang="de-DE" sz="1600" b="1" dirty="0">
+                <a:latin typeface="Courier New" panose="02070309020205020404" pitchFamily="49" charset="0"/>
+                <a:cs typeface="Courier New" panose="02070309020205020404" pitchFamily="49" charset="0"/>
+              </a:rPr>
+              <a:t> == 100) { </a:t>
+            </a:r>
+            <a:r>
+              <a:rPr lang="de-DE" sz="1600" dirty="0">
+                <a:latin typeface="Courier New" panose="02070309020205020404" pitchFamily="49" charset="0"/>
+                <a:cs typeface="Courier New" panose="02070309020205020404" pitchFamily="49" charset="0"/>
+              </a:rPr>
+              <a:t>// 1003 </a:t>
+            </a:r>
+            <a:r>
+              <a:rPr lang="de-DE" sz="1600" dirty="0" err="1">
+                <a:latin typeface="Courier New" panose="02070309020205020404" pitchFamily="49" charset="0"/>
+                <a:cs typeface="Courier New" panose="02070309020205020404" pitchFamily="49" charset="0"/>
+              </a:rPr>
+              <a:t>is</a:t>
+            </a:r>
+            <a:r>
+              <a:rPr lang="de-DE" sz="1600" dirty="0">
+                <a:latin typeface="Courier New" panose="02070309020205020404" pitchFamily="49" charset="0"/>
+                <a:cs typeface="Courier New" panose="02070309020205020404" pitchFamily="49" charset="0"/>
+              </a:rPr>
+              <a:t> </a:t>
+            </a:r>
+            <a:r>
+              <a:rPr lang="de-DE" sz="1600" dirty="0" err="1">
+                <a:latin typeface="Courier New" panose="02070309020205020404" pitchFamily="49" charset="0"/>
+                <a:cs typeface="Courier New" panose="02070309020205020404" pitchFamily="49" charset="0"/>
+              </a:rPr>
+              <a:t>the</a:t>
+            </a:r>
+            <a:r>
+              <a:rPr lang="de-DE" sz="1600" dirty="0">
+                <a:latin typeface="Courier New" panose="02070309020205020404" pitchFamily="49" charset="0"/>
+                <a:cs typeface="Courier New" panose="02070309020205020404" pitchFamily="49" charset="0"/>
+              </a:rPr>
+              <a:t> </a:t>
+            </a:r>
+            <a:r>
+              <a:rPr lang="de-DE" sz="1600" dirty="0" err="1">
+                <a:latin typeface="Courier New" panose="02070309020205020404" pitchFamily="49" charset="0"/>
+                <a:cs typeface="Courier New" panose="02070309020205020404" pitchFamily="49" charset="0"/>
+              </a:rPr>
+              <a:t>flag</a:t>
+            </a:r>
+            <a:r>
+              <a:rPr lang="de-DE" sz="1600" dirty="0">
+                <a:latin typeface="Courier New" panose="02070309020205020404" pitchFamily="49" charset="0"/>
+                <a:cs typeface="Courier New" panose="02070309020205020404" pitchFamily="49" charset="0"/>
+              </a:rPr>
+              <a:t> / 100 </a:t>
+            </a:r>
+            <a:r>
+              <a:rPr lang="de-DE" sz="1600" dirty="0" err="1">
+                <a:latin typeface="Courier New" panose="02070309020205020404" pitchFamily="49" charset="0"/>
+                <a:cs typeface="Courier New" panose="02070309020205020404" pitchFamily="49" charset="0"/>
+              </a:rPr>
+              <a:t>is</a:t>
+            </a:r>
+            <a:r>
+              <a:rPr lang="de-DE" sz="1600" dirty="0">
+                <a:latin typeface="Courier New" panose="02070309020205020404" pitchFamily="49" charset="0"/>
+                <a:cs typeface="Courier New" panose="02070309020205020404" pitchFamily="49" charset="0"/>
+              </a:rPr>
+              <a:t> </a:t>
+            </a:r>
+            <a:r>
+              <a:rPr lang="de-DE" sz="1600" dirty="0" err="1">
+                <a:latin typeface="Courier New" panose="02070309020205020404" pitchFamily="49" charset="0"/>
+                <a:cs typeface="Courier New" panose="02070309020205020404" pitchFamily="49" charset="0"/>
+              </a:rPr>
+              <a:t>the</a:t>
+            </a:r>
+            <a:r>
+              <a:rPr lang="de-DE" sz="1600" dirty="0">
+                <a:latin typeface="Courier New" panose="02070309020205020404" pitchFamily="49" charset="0"/>
+                <a:cs typeface="Courier New" panose="02070309020205020404" pitchFamily="49" charset="0"/>
+              </a:rPr>
+              <a:t> </a:t>
+            </a:r>
+            <a:r>
+              <a:rPr lang="de-DE" sz="1600" dirty="0" err="1">
+                <a:latin typeface="Courier New" panose="02070309020205020404" pitchFamily="49" charset="0"/>
+                <a:cs typeface="Courier New" panose="02070309020205020404" pitchFamily="49" charset="0"/>
+              </a:rPr>
+              <a:t>allied</a:t>
+            </a:r>
+            <a:r>
+              <a:rPr lang="de-DE" sz="1600" dirty="0">
+                <a:latin typeface="Courier New" panose="02070309020205020404" pitchFamily="49" charset="0"/>
+                <a:cs typeface="Courier New" panose="02070309020205020404" pitchFamily="49" charset="0"/>
+              </a:rPr>
+              <a:t> </a:t>
+            </a:r>
+            <a:r>
+              <a:rPr lang="de-DE" sz="1600" dirty="0" err="1">
+                <a:latin typeface="Courier New" panose="02070309020205020404" pitchFamily="49" charset="0"/>
+                <a:cs typeface="Courier New" panose="02070309020205020404" pitchFamily="49" charset="0"/>
+              </a:rPr>
+              <a:t>team</a:t>
+            </a:r>
+            <a:br>
+              <a:rPr lang="de-DE" sz="1600" dirty="0">
+                <a:latin typeface="Courier New" panose="02070309020205020404" pitchFamily="49" charset="0"/>
+                <a:cs typeface="Courier New" panose="02070309020205020404" pitchFamily="49" charset="0"/>
+              </a:rPr>
+            </a:br>
+            <a:br>
+              <a:rPr lang="de-DE" sz="1600" b="1" dirty="0">
+                <a:latin typeface="Courier New" panose="02070309020205020404" pitchFamily="49" charset="0"/>
+                <a:cs typeface="Courier New" panose="02070309020205020404" pitchFamily="49" charset="0"/>
+              </a:rPr>
+            </a:br>
+            <a:r>
+              <a:rPr lang="de-DE" sz="1600" b="1" dirty="0">
+                <a:latin typeface="Courier New" panose="02070309020205020404" pitchFamily="49" charset="0"/>
+                <a:cs typeface="Courier New" panose="02070309020205020404" pitchFamily="49" charset="0"/>
+              </a:rPr>
+              <a:t>    .</a:t>
+            </a:r>
+            <a:r>
+              <a:rPr lang="de-DE" sz="1600" b="1" dirty="0" err="1">
+                <a:latin typeface="Courier New" panose="02070309020205020404" pitchFamily="49" charset="0"/>
+                <a:cs typeface="Courier New" panose="02070309020205020404" pitchFamily="49" charset="0"/>
+              </a:rPr>
+              <a:t>nth</a:t>
+            </a:r>
+            <a:r>
+              <a:rPr lang="de-DE" sz="1600" b="1" dirty="0">
+                <a:latin typeface="Courier New" panose="02070309020205020404" pitchFamily="49" charset="0"/>
+                <a:cs typeface="Courier New" panose="02070309020205020404" pitchFamily="49" charset="0"/>
+              </a:rPr>
+              <a:t>(6, </a:t>
+            </a:r>
+            <a:r>
+              <a:rPr lang="de-DE" sz="1600" b="1" dirty="0" err="1">
+                <a:latin typeface="Courier New" panose="02070309020205020404" pitchFamily="49" charset="0"/>
+                <a:cs typeface="Courier New" panose="02070309020205020404" pitchFamily="49" charset="0"/>
+              </a:rPr>
+              <a:t>AimedAgent</a:t>
+            </a:r>
+            <a:r>
+              <a:rPr lang="de-DE" sz="1600" b="1" dirty="0">
+                <a:latin typeface="Courier New" panose="02070309020205020404" pitchFamily="49" charset="0"/>
+                <a:cs typeface="Courier New" panose="02070309020205020404" pitchFamily="49" charset="0"/>
+              </a:rPr>
+              <a:t>, </a:t>
+            </a:r>
+            <a:r>
+              <a:rPr lang="de-DE" sz="1600" b="1" dirty="0" err="1">
+                <a:latin typeface="Courier New" panose="02070309020205020404" pitchFamily="49" charset="0"/>
+                <a:cs typeface="Courier New" panose="02070309020205020404" pitchFamily="49" charset="0"/>
+              </a:rPr>
+              <a:t>NewDestination</a:t>
+            </a:r>
+            <a:r>
+              <a:rPr lang="de-DE" sz="1600" b="1" dirty="0">
+                <a:latin typeface="Courier New" panose="02070309020205020404" pitchFamily="49" charset="0"/>
+                <a:cs typeface="Courier New" panose="02070309020205020404" pitchFamily="49" charset="0"/>
+              </a:rPr>
+              <a:t>);</a:t>
+            </a:r>
+            <a:br>
+              <a:rPr lang="de-DE" sz="1600" b="1" dirty="0">
+                <a:latin typeface="Courier New" panose="02070309020205020404" pitchFamily="49" charset="0"/>
+                <a:cs typeface="Courier New" panose="02070309020205020404" pitchFamily="49" charset="0"/>
+              </a:rPr>
+            </a:br>
+            <a:r>
+              <a:rPr lang="de-DE" sz="1600" b="1" dirty="0">
+                <a:latin typeface="Courier New" panose="02070309020205020404" pitchFamily="49" charset="0"/>
+                <a:cs typeface="Courier New" panose="02070309020205020404" pitchFamily="49" charset="0"/>
+              </a:rPr>
+              <a:t>    ?</a:t>
+            </a:r>
+            <a:r>
+              <a:rPr lang="de-DE" sz="1600" b="1" dirty="0" err="1">
+                <a:latin typeface="Courier New" panose="02070309020205020404" pitchFamily="49" charset="0"/>
+                <a:cs typeface="Courier New" panose="02070309020205020404" pitchFamily="49" charset="0"/>
+              </a:rPr>
+              <a:t>debug</a:t>
+            </a:r>
+            <a:r>
+              <a:rPr lang="de-DE" sz="1600" b="1" dirty="0">
+                <a:latin typeface="Courier New" panose="02070309020205020404" pitchFamily="49" charset="0"/>
+                <a:cs typeface="Courier New" panose="02070309020205020404" pitchFamily="49" charset="0"/>
+              </a:rPr>
+              <a:t>(Mode); </a:t>
+            </a:r>
+            <a:r>
+              <a:rPr lang="de-DE" sz="1600" b="1" dirty="0" err="1">
+                <a:latin typeface="Courier New" panose="02070309020205020404" pitchFamily="49" charset="0"/>
+                <a:cs typeface="Courier New" panose="02070309020205020404" pitchFamily="49" charset="0"/>
+              </a:rPr>
+              <a:t>if</a:t>
+            </a:r>
+            <a:r>
+              <a:rPr lang="de-DE" sz="1600" b="1" dirty="0">
+                <a:latin typeface="Courier New" panose="02070309020205020404" pitchFamily="49" charset="0"/>
+                <a:cs typeface="Courier New" panose="02070309020205020404" pitchFamily="49" charset="0"/>
+              </a:rPr>
+              <a:t> (Mode&lt;=1) { .</a:t>
+            </a:r>
+            <a:r>
+              <a:rPr lang="de-DE" sz="1600" b="1" dirty="0" err="1">
+                <a:latin typeface="Courier New" panose="02070309020205020404" pitchFamily="49" charset="0"/>
+                <a:cs typeface="Courier New" panose="02070309020205020404" pitchFamily="49" charset="0"/>
+              </a:rPr>
+              <a:t>println</a:t>
+            </a:r>
+            <a:r>
+              <a:rPr lang="de-DE" sz="1600" b="1" dirty="0">
+                <a:latin typeface="Courier New" panose="02070309020205020404" pitchFamily="49" charset="0"/>
+                <a:cs typeface="Courier New" panose="02070309020205020404" pitchFamily="49" charset="0"/>
+              </a:rPr>
+              <a:t>("NUEVO DESTINO MARCADO: ", </a:t>
+            </a:r>
+            <a:r>
+              <a:rPr lang="de-DE" sz="1600" b="1" dirty="0" err="1">
+                <a:latin typeface="Courier New" panose="02070309020205020404" pitchFamily="49" charset="0"/>
+                <a:cs typeface="Courier New" panose="02070309020205020404" pitchFamily="49" charset="0"/>
+              </a:rPr>
+              <a:t>NewDestination</a:t>
+            </a:r>
+            <a:r>
+              <a:rPr lang="de-DE" sz="1600" b="1" dirty="0">
+                <a:latin typeface="Courier New" panose="02070309020205020404" pitchFamily="49" charset="0"/>
+                <a:cs typeface="Courier New" panose="02070309020205020404" pitchFamily="49" charset="0"/>
+              </a:rPr>
+              <a:t>); }</a:t>
+            </a:r>
+            <a:br>
+              <a:rPr lang="de-DE" sz="1600" b="1" dirty="0">
+                <a:latin typeface="Courier New" panose="02070309020205020404" pitchFamily="49" charset="0"/>
+                <a:cs typeface="Courier New" panose="02070309020205020404" pitchFamily="49" charset="0"/>
+              </a:rPr>
+            </a:br>
+            <a:r>
+              <a:rPr lang="de-DE" sz="1600" b="1" dirty="0">
+                <a:latin typeface="Courier New" panose="02070309020205020404" pitchFamily="49" charset="0"/>
+                <a:cs typeface="Courier New" panose="02070309020205020404" pitchFamily="49" charset="0"/>
+              </a:rPr>
+              <a:t>    </a:t>
+            </a:r>
+            <a:br>
+              <a:rPr lang="de-DE" sz="1600" b="1" dirty="0">
+                <a:latin typeface="Courier New" panose="02070309020205020404" pitchFamily="49" charset="0"/>
+                <a:cs typeface="Courier New" panose="02070309020205020404" pitchFamily="49" charset="0"/>
+              </a:rPr>
+            </a:br>
+            <a:r>
+              <a:rPr lang="de-DE" sz="1600" b="1" dirty="0">
+                <a:latin typeface="Courier New" panose="02070309020205020404" pitchFamily="49" charset="0"/>
+                <a:cs typeface="Courier New" panose="02070309020205020404" pitchFamily="49" charset="0"/>
+              </a:rPr>
+              <a:t>    </a:t>
+            </a:r>
+            <a:r>
+              <a:rPr lang="de-DE" sz="1600" dirty="0">
+                <a:latin typeface="Courier New" panose="02070309020205020404" pitchFamily="49" charset="0"/>
+                <a:cs typeface="Courier New" panose="02070309020205020404" pitchFamily="49" charset="0"/>
+              </a:rPr>
+              <a:t>//</a:t>
+            </a:r>
+            <a:r>
+              <a:rPr lang="de-DE" sz="1600" dirty="0" err="1">
+                <a:latin typeface="Courier New" panose="02070309020205020404" pitchFamily="49" charset="0"/>
+                <a:cs typeface="Courier New" panose="02070309020205020404" pitchFamily="49" charset="0"/>
+              </a:rPr>
+              <a:t>Strategy</a:t>
+            </a:r>
+            <a:r>
+              <a:rPr lang="de-DE" sz="1600" dirty="0">
+                <a:latin typeface="Courier New" panose="02070309020205020404" pitchFamily="49" charset="0"/>
+                <a:cs typeface="Courier New" panose="02070309020205020404" pitchFamily="49" charset="0"/>
+              </a:rPr>
+              <a:t>: follow </a:t>
+            </a:r>
+            <a:r>
+              <a:rPr lang="de-DE" sz="1600" dirty="0" err="1">
+                <a:latin typeface="Courier New" panose="02070309020205020404" pitchFamily="49" charset="0"/>
+                <a:cs typeface="Courier New" panose="02070309020205020404" pitchFamily="49" charset="0"/>
+              </a:rPr>
+              <a:t>the</a:t>
+            </a:r>
+            <a:r>
+              <a:rPr lang="de-DE" sz="1600" dirty="0">
+                <a:latin typeface="Courier New" panose="02070309020205020404" pitchFamily="49" charset="0"/>
+                <a:cs typeface="Courier New" panose="02070309020205020404" pitchFamily="49" charset="0"/>
+              </a:rPr>
+              <a:t> </a:t>
+            </a:r>
+            <a:r>
+              <a:rPr lang="de-DE" sz="1600" dirty="0" err="1">
+                <a:latin typeface="Courier New" panose="02070309020205020404" pitchFamily="49" charset="0"/>
+                <a:cs typeface="Courier New" panose="02070309020205020404" pitchFamily="49" charset="0"/>
+              </a:rPr>
+              <a:t>enemy</a:t>
+            </a:r>
+            <a:r>
+              <a:rPr lang="de-DE" sz="1600" dirty="0">
+                <a:latin typeface="Courier New" panose="02070309020205020404" pitchFamily="49" charset="0"/>
+                <a:cs typeface="Courier New" panose="02070309020205020404" pitchFamily="49" charset="0"/>
+              </a:rPr>
+              <a:t> </a:t>
+            </a:r>
+            <a:r>
+              <a:rPr lang="de-DE" sz="1600" dirty="0" err="1">
+                <a:latin typeface="Courier New" panose="02070309020205020404" pitchFamily="49" charset="0"/>
+                <a:cs typeface="Courier New" panose="02070309020205020404" pitchFamily="49" charset="0"/>
+              </a:rPr>
+              <a:t>and</a:t>
+            </a:r>
+            <a:r>
+              <a:rPr lang="de-DE" sz="1600" dirty="0">
+                <a:latin typeface="Courier New" panose="02070309020205020404" pitchFamily="49" charset="0"/>
+                <a:cs typeface="Courier New" panose="02070309020205020404" pitchFamily="49" charset="0"/>
+              </a:rPr>
+              <a:t> </a:t>
+            </a:r>
+            <a:r>
+              <a:rPr lang="de-DE" sz="1600" dirty="0" err="1">
+                <a:latin typeface="Courier New" panose="02070309020205020404" pitchFamily="49" charset="0"/>
+                <a:cs typeface="Courier New" panose="02070309020205020404" pitchFamily="49" charset="0"/>
+              </a:rPr>
+              <a:t>the</a:t>
+            </a:r>
+            <a:r>
+              <a:rPr lang="de-DE" sz="1600" dirty="0">
+                <a:latin typeface="Courier New" panose="02070309020205020404" pitchFamily="49" charset="0"/>
+                <a:cs typeface="Courier New" panose="02070309020205020404" pitchFamily="49" charset="0"/>
+              </a:rPr>
+              <a:t> </a:t>
+            </a:r>
+            <a:r>
+              <a:rPr lang="de-DE" sz="1600" dirty="0" err="1">
+                <a:latin typeface="Courier New" panose="02070309020205020404" pitchFamily="49" charset="0"/>
+                <a:cs typeface="Courier New" panose="02070309020205020404" pitchFamily="49" charset="0"/>
+              </a:rPr>
+              <a:t>enemy</a:t>
+            </a:r>
+            <a:r>
+              <a:rPr lang="de-DE" sz="1600" dirty="0">
+                <a:latin typeface="Courier New" panose="02070309020205020404" pitchFamily="49" charset="0"/>
+                <a:cs typeface="Courier New" panose="02070309020205020404" pitchFamily="49" charset="0"/>
+              </a:rPr>
+              <a:t> </a:t>
+            </a:r>
+            <a:r>
+              <a:rPr lang="de-DE" sz="1600" dirty="0" err="1">
+                <a:latin typeface="Courier New" panose="02070309020205020404" pitchFamily="49" charset="0"/>
+                <a:cs typeface="Courier New" panose="02070309020205020404" pitchFamily="49" charset="0"/>
+              </a:rPr>
+              <a:t>with</a:t>
+            </a:r>
+            <a:r>
+              <a:rPr lang="de-DE" sz="1600" dirty="0">
+                <a:latin typeface="Courier New" panose="02070309020205020404" pitchFamily="49" charset="0"/>
+                <a:cs typeface="Courier New" panose="02070309020205020404" pitchFamily="49" charset="0"/>
+              </a:rPr>
+              <a:t> </a:t>
+            </a:r>
+            <a:r>
+              <a:rPr lang="de-DE" sz="1600" dirty="0" err="1">
+                <a:latin typeface="Courier New" panose="02070309020205020404" pitchFamily="49" charset="0"/>
+                <a:cs typeface="Courier New" panose="02070309020205020404" pitchFamily="49" charset="0"/>
+              </a:rPr>
+              <a:t>the</a:t>
+            </a:r>
+            <a:r>
+              <a:rPr lang="de-DE" sz="1600" dirty="0">
+                <a:latin typeface="Courier New" panose="02070309020205020404" pitchFamily="49" charset="0"/>
+                <a:cs typeface="Courier New" panose="02070309020205020404" pitchFamily="49" charset="0"/>
+              </a:rPr>
+              <a:t> </a:t>
+            </a:r>
+            <a:r>
+              <a:rPr lang="de-DE" sz="1600" dirty="0" err="1">
+                <a:latin typeface="Courier New" panose="02070309020205020404" pitchFamily="49" charset="0"/>
+                <a:cs typeface="Courier New" panose="02070309020205020404" pitchFamily="49" charset="0"/>
+              </a:rPr>
+              <a:t>flag</a:t>
+            </a:r>
+            <a:r>
+              <a:rPr lang="de-DE" sz="1600" dirty="0">
+                <a:latin typeface="Courier New" panose="02070309020205020404" pitchFamily="49" charset="0"/>
+                <a:cs typeface="Courier New" panose="02070309020205020404" pitchFamily="49" charset="0"/>
+              </a:rPr>
+              <a:t> </a:t>
+            </a:r>
+            <a:r>
+              <a:rPr lang="de-DE" sz="1600" dirty="0" err="1">
+                <a:latin typeface="Courier New" panose="02070309020205020404" pitchFamily="49" charset="0"/>
+                <a:cs typeface="Courier New" panose="02070309020205020404" pitchFamily="49" charset="0"/>
+              </a:rPr>
+              <a:t>and</a:t>
+            </a:r>
+            <a:r>
+              <a:rPr lang="de-DE" sz="1600" dirty="0">
+                <a:latin typeface="Courier New" panose="02070309020205020404" pitchFamily="49" charset="0"/>
+                <a:cs typeface="Courier New" panose="02070309020205020404" pitchFamily="49" charset="0"/>
+              </a:rPr>
+              <a:t> </a:t>
+            </a:r>
+            <a:r>
+              <a:rPr lang="de-DE" sz="1600" dirty="0" err="1">
+                <a:latin typeface="Courier New" panose="02070309020205020404" pitchFamily="49" charset="0"/>
+                <a:cs typeface="Courier New" panose="02070309020205020404" pitchFamily="49" charset="0"/>
+              </a:rPr>
+              <a:t>take</a:t>
+            </a:r>
+            <a:r>
+              <a:rPr lang="de-DE" sz="1600" dirty="0">
+                <a:latin typeface="Courier New" panose="02070309020205020404" pitchFamily="49" charset="0"/>
+                <a:cs typeface="Courier New" panose="02070309020205020404" pitchFamily="49" charset="0"/>
+              </a:rPr>
+              <a:t> </a:t>
+            </a:r>
+            <a:r>
+              <a:rPr lang="de-DE" sz="1600" dirty="0" err="1">
+                <a:latin typeface="Courier New" panose="02070309020205020404" pitchFamily="49" charset="0"/>
+                <a:cs typeface="Courier New" panose="02070309020205020404" pitchFamily="49" charset="0"/>
+              </a:rPr>
+              <a:t>the</a:t>
+            </a:r>
+            <a:r>
+              <a:rPr lang="de-DE" sz="1600" dirty="0">
+                <a:latin typeface="Courier New" panose="02070309020205020404" pitchFamily="49" charset="0"/>
+                <a:cs typeface="Courier New" panose="02070309020205020404" pitchFamily="49" charset="0"/>
+              </a:rPr>
+              <a:t> </a:t>
+            </a:r>
+            <a:r>
+              <a:rPr lang="de-DE" sz="1600" dirty="0" err="1">
+                <a:latin typeface="Courier New" panose="02070309020205020404" pitchFamily="49" charset="0"/>
+                <a:cs typeface="Courier New" panose="02070309020205020404" pitchFamily="49" charset="0"/>
+              </a:rPr>
+              <a:t>flag</a:t>
+            </a:r>
+            <a:br>
+              <a:rPr lang="de-DE" sz="1600" b="1" dirty="0">
+                <a:latin typeface="Courier New" panose="02070309020205020404" pitchFamily="49" charset="0"/>
+                <a:cs typeface="Courier New" panose="02070309020205020404" pitchFamily="49" charset="0"/>
+              </a:rPr>
+            </a:br>
+            <a:r>
+              <a:rPr lang="de-DE" sz="1600" b="1" dirty="0">
+                <a:latin typeface="Courier New" panose="02070309020205020404" pitchFamily="49" charset="0"/>
+                <a:cs typeface="Courier New" panose="02070309020205020404" pitchFamily="49" charset="0"/>
+              </a:rPr>
+              <a:t>    ?</a:t>
+            </a:r>
+            <a:r>
+              <a:rPr lang="de-DE" sz="1600" b="1" dirty="0" err="1">
+                <a:latin typeface="Courier New" panose="02070309020205020404" pitchFamily="49" charset="0"/>
+                <a:cs typeface="Courier New" panose="02070309020205020404" pitchFamily="49" charset="0"/>
+              </a:rPr>
+              <a:t>prio</a:t>
+            </a:r>
+            <a:r>
+              <a:rPr lang="de-DE" sz="1600" b="1" dirty="0">
+                <a:latin typeface="Courier New" panose="02070309020205020404" pitchFamily="49" charset="0"/>
+                <a:cs typeface="Courier New" panose="02070309020205020404" pitchFamily="49" charset="0"/>
+              </a:rPr>
+              <a:t>(P); </a:t>
+            </a:r>
+            <a:r>
+              <a:rPr lang="de-DE" sz="1600" dirty="0">
+                <a:latin typeface="Courier New" panose="02070309020205020404" pitchFamily="49" charset="0"/>
+                <a:cs typeface="Courier New" panose="02070309020205020404" pitchFamily="49" charset="0"/>
+              </a:rPr>
+              <a:t>//</a:t>
+            </a:r>
+            <a:r>
+              <a:rPr lang="de-DE" sz="1600" dirty="0" err="1">
+                <a:latin typeface="Courier New" panose="02070309020205020404" pitchFamily="49" charset="0"/>
+                <a:cs typeface="Courier New" panose="02070309020205020404" pitchFamily="49" charset="0"/>
+              </a:rPr>
+              <a:t>store</a:t>
+            </a:r>
+            <a:r>
+              <a:rPr lang="de-DE" sz="1600" dirty="0">
+                <a:latin typeface="Courier New" panose="02070309020205020404" pitchFamily="49" charset="0"/>
+                <a:cs typeface="Courier New" panose="02070309020205020404" pitchFamily="49" charset="0"/>
+              </a:rPr>
+              <a:t> </a:t>
+            </a:r>
+            <a:r>
+              <a:rPr lang="de-DE" sz="1600" dirty="0" err="1">
+                <a:latin typeface="Courier New" panose="02070309020205020404" pitchFamily="49" charset="0"/>
+                <a:cs typeface="Courier New" panose="02070309020205020404" pitchFamily="49" charset="0"/>
+              </a:rPr>
+              <a:t>the</a:t>
+            </a:r>
+            <a:r>
+              <a:rPr lang="de-DE" sz="1600" dirty="0">
+                <a:latin typeface="Courier New" panose="02070309020205020404" pitchFamily="49" charset="0"/>
+                <a:cs typeface="Courier New" panose="02070309020205020404" pitchFamily="49" charset="0"/>
+              </a:rPr>
+              <a:t> </a:t>
+            </a:r>
+            <a:r>
+              <a:rPr lang="de-DE" sz="1600" dirty="0" err="1">
+                <a:latin typeface="Courier New" panose="02070309020205020404" pitchFamily="49" charset="0"/>
+                <a:cs typeface="Courier New" panose="02070309020205020404" pitchFamily="49" charset="0"/>
+              </a:rPr>
+              <a:t>priority</a:t>
+            </a:r>
+            <a:r>
+              <a:rPr lang="de-DE" sz="1600" dirty="0">
+                <a:latin typeface="Courier New" panose="02070309020205020404" pitchFamily="49" charset="0"/>
+                <a:cs typeface="Courier New" panose="02070309020205020404" pitchFamily="49" charset="0"/>
+              </a:rPr>
+              <a:t> on P</a:t>
+            </a:r>
+            <a:br>
+              <a:rPr lang="de-DE" sz="1600" dirty="0">
+                <a:latin typeface="Courier New" panose="02070309020205020404" pitchFamily="49" charset="0"/>
+                <a:cs typeface="Courier New" panose="02070309020205020404" pitchFamily="49" charset="0"/>
+              </a:rPr>
+            </a:br>
+            <a:r>
+              <a:rPr lang="de-DE" sz="1600" b="1" dirty="0">
+                <a:latin typeface="Courier New" panose="02070309020205020404" pitchFamily="49" charset="0"/>
+                <a:cs typeface="Courier New" panose="02070309020205020404" pitchFamily="49" charset="0"/>
+              </a:rPr>
+              <a:t>    </a:t>
+            </a:r>
+            <a:r>
+              <a:rPr lang="de-DE" sz="1600" dirty="0">
+                <a:latin typeface="Courier New" panose="02070309020205020404" pitchFamily="49" charset="0"/>
+                <a:cs typeface="Courier New" panose="02070309020205020404" pitchFamily="49" charset="0"/>
+              </a:rPr>
+              <a:t>/*</a:t>
+            </a:r>
+            <a:br>
+              <a:rPr lang="de-DE" sz="1600" dirty="0">
+                <a:latin typeface="Courier New" panose="02070309020205020404" pitchFamily="49" charset="0"/>
+                <a:cs typeface="Courier New" panose="02070309020205020404" pitchFamily="49" charset="0"/>
+              </a:rPr>
+            </a:br>
+            <a:r>
+              <a:rPr lang="de-DE" sz="1600" dirty="0">
+                <a:latin typeface="Courier New" panose="02070309020205020404" pitchFamily="49" charset="0"/>
+                <a:cs typeface="Courier New" panose="02070309020205020404" pitchFamily="49" charset="0"/>
+              </a:rPr>
+              <a:t>    Create a </a:t>
+            </a:r>
+            <a:r>
+              <a:rPr lang="de-DE" sz="1600" dirty="0" err="1">
+                <a:latin typeface="Courier New" panose="02070309020205020404" pitchFamily="49" charset="0"/>
+                <a:cs typeface="Courier New" panose="02070309020205020404" pitchFamily="49" charset="0"/>
+              </a:rPr>
+              <a:t>new</a:t>
+            </a:r>
+            <a:r>
+              <a:rPr lang="de-DE" sz="1600" dirty="0">
+                <a:latin typeface="Courier New" panose="02070309020205020404" pitchFamily="49" charset="0"/>
+                <a:cs typeface="Courier New" panose="02070309020205020404" pitchFamily="49" charset="0"/>
+              </a:rPr>
+              <a:t> </a:t>
+            </a:r>
+            <a:r>
+              <a:rPr lang="de-DE" sz="1600" dirty="0" err="1">
+                <a:latin typeface="Courier New" panose="02070309020205020404" pitchFamily="49" charset="0"/>
+                <a:cs typeface="Courier New" panose="02070309020205020404" pitchFamily="49" charset="0"/>
+              </a:rPr>
+              <a:t>task</a:t>
+            </a:r>
+            <a:r>
+              <a:rPr lang="de-DE" sz="1600" dirty="0">
+                <a:latin typeface="Courier New" panose="02070309020205020404" pitchFamily="49" charset="0"/>
+                <a:cs typeface="Courier New" panose="02070309020205020404" pitchFamily="49" charset="0"/>
+              </a:rPr>
+              <a:t> </a:t>
+            </a:r>
+            <a:r>
+              <a:rPr lang="de-DE" sz="1600" dirty="0" err="1">
+                <a:latin typeface="Courier New" panose="02070309020205020404" pitchFamily="49" charset="0"/>
+                <a:cs typeface="Courier New" panose="02070309020205020404" pitchFamily="49" charset="0"/>
+              </a:rPr>
+              <a:t>with</a:t>
+            </a:r>
+            <a:r>
+              <a:rPr lang="de-DE" sz="1600" dirty="0">
+                <a:latin typeface="Courier New" panose="02070309020205020404" pitchFamily="49" charset="0"/>
+                <a:cs typeface="Courier New" panose="02070309020205020404" pitchFamily="49" charset="0"/>
+              </a:rPr>
+              <a:t> </a:t>
+            </a:r>
+            <a:r>
+              <a:rPr lang="de-DE" sz="1600" dirty="0" err="1">
+                <a:latin typeface="Courier New" panose="02070309020205020404" pitchFamily="49" charset="0"/>
+                <a:cs typeface="Courier New" panose="02070309020205020404" pitchFamily="49" charset="0"/>
+              </a:rPr>
+              <a:t>the</a:t>
+            </a:r>
+            <a:r>
+              <a:rPr lang="de-DE" sz="1600" dirty="0">
+                <a:latin typeface="Courier New" panose="02070309020205020404" pitchFamily="49" charset="0"/>
+                <a:cs typeface="Courier New" panose="02070309020205020404" pitchFamily="49" charset="0"/>
+              </a:rPr>
+              <a:t> </a:t>
+            </a:r>
+            <a:r>
+              <a:rPr lang="de-DE" sz="1600" dirty="0" err="1">
+                <a:latin typeface="Courier New" panose="02070309020205020404" pitchFamily="49" charset="0"/>
+                <a:cs typeface="Courier New" panose="02070309020205020404" pitchFamily="49" charset="0"/>
+              </a:rPr>
+              <a:t>highest</a:t>
+            </a:r>
+            <a:r>
+              <a:rPr lang="de-DE" sz="1600" dirty="0">
+                <a:latin typeface="Courier New" panose="02070309020205020404" pitchFamily="49" charset="0"/>
+                <a:cs typeface="Courier New" panose="02070309020205020404" pitchFamily="49" charset="0"/>
+              </a:rPr>
+              <a:t> </a:t>
+            </a:r>
+            <a:r>
+              <a:rPr lang="de-DE" sz="1600" dirty="0" err="1">
+                <a:latin typeface="Courier New" panose="02070309020205020404" pitchFamily="49" charset="0"/>
+                <a:cs typeface="Courier New" panose="02070309020205020404" pitchFamily="49" charset="0"/>
+              </a:rPr>
+              <a:t>priority</a:t>
+            </a:r>
+            <a:r>
+              <a:rPr lang="de-DE" sz="1600" dirty="0">
+                <a:latin typeface="Courier New" panose="02070309020205020404" pitchFamily="49" charset="0"/>
+                <a:cs typeface="Courier New" panose="02070309020205020404" pitchFamily="49" charset="0"/>
+              </a:rPr>
+              <a:t> in </a:t>
+            </a:r>
+            <a:r>
+              <a:rPr lang="de-DE" sz="1600" dirty="0" err="1">
+                <a:latin typeface="Courier New" panose="02070309020205020404" pitchFamily="49" charset="0"/>
+                <a:cs typeface="Courier New" panose="02070309020205020404" pitchFamily="49" charset="0"/>
+              </a:rPr>
+              <a:t>order</a:t>
+            </a:r>
+            <a:r>
+              <a:rPr lang="de-DE" sz="1600" dirty="0">
+                <a:latin typeface="Courier New" panose="02070309020205020404" pitchFamily="49" charset="0"/>
+                <a:cs typeface="Courier New" panose="02070309020205020404" pitchFamily="49" charset="0"/>
+              </a:rPr>
+              <a:t> </a:t>
+            </a:r>
+            <a:r>
+              <a:rPr lang="de-DE" sz="1600" dirty="0" err="1">
+                <a:latin typeface="Courier New" panose="02070309020205020404" pitchFamily="49" charset="0"/>
+                <a:cs typeface="Courier New" panose="02070309020205020404" pitchFamily="49" charset="0"/>
+              </a:rPr>
+              <a:t>to</a:t>
+            </a:r>
+            <a:r>
+              <a:rPr lang="de-DE" sz="1600" dirty="0">
+                <a:latin typeface="Courier New" panose="02070309020205020404" pitchFamily="49" charset="0"/>
+                <a:cs typeface="Courier New" panose="02070309020205020404" pitchFamily="49" charset="0"/>
+              </a:rPr>
+              <a:t> </a:t>
+            </a:r>
+            <a:r>
+              <a:rPr lang="de-DE" sz="1600" dirty="0" err="1">
+                <a:latin typeface="Courier New" panose="02070309020205020404" pitchFamily="49" charset="0"/>
+                <a:cs typeface="Courier New" panose="02070309020205020404" pitchFamily="49" charset="0"/>
+              </a:rPr>
+              <a:t>pursue</a:t>
+            </a:r>
+            <a:r>
+              <a:rPr lang="de-DE" sz="1600" dirty="0">
+                <a:latin typeface="Courier New" panose="02070309020205020404" pitchFamily="49" charset="0"/>
+                <a:cs typeface="Courier New" panose="02070309020205020404" pitchFamily="49" charset="0"/>
+              </a:rPr>
+              <a:t> </a:t>
+            </a:r>
+            <a:r>
+              <a:rPr lang="de-DE" sz="1600" dirty="0" err="1">
+                <a:latin typeface="Courier New" panose="02070309020205020404" pitchFamily="49" charset="0"/>
+                <a:cs typeface="Courier New" panose="02070309020205020404" pitchFamily="49" charset="0"/>
+              </a:rPr>
+              <a:t>the</a:t>
+            </a:r>
+            <a:r>
+              <a:rPr lang="de-DE" sz="1600" dirty="0">
+                <a:latin typeface="Courier New" panose="02070309020205020404" pitchFamily="49" charset="0"/>
+                <a:cs typeface="Courier New" panose="02070309020205020404" pitchFamily="49" charset="0"/>
+              </a:rPr>
+              <a:t> </a:t>
+            </a:r>
+            <a:r>
+              <a:rPr lang="de-DE" sz="1600" dirty="0" err="1">
+                <a:latin typeface="Courier New" panose="02070309020205020404" pitchFamily="49" charset="0"/>
+                <a:cs typeface="Courier New" panose="02070309020205020404" pitchFamily="49" charset="0"/>
+              </a:rPr>
+              <a:t>enemy</a:t>
+            </a:r>
+            <a:r>
+              <a:rPr lang="de-DE" sz="1600" dirty="0">
+                <a:latin typeface="Courier New" panose="02070309020205020404" pitchFamily="49" charset="0"/>
+                <a:cs typeface="Courier New" panose="02070309020205020404" pitchFamily="49" charset="0"/>
+              </a:rPr>
+              <a:t> </a:t>
+            </a:r>
+            <a:r>
+              <a:rPr lang="de-DE" sz="1600" dirty="0" err="1">
+                <a:latin typeface="Courier New" panose="02070309020205020404" pitchFamily="49" charset="0"/>
+                <a:cs typeface="Courier New" panose="02070309020205020404" pitchFamily="49" charset="0"/>
+              </a:rPr>
+              <a:t>and</a:t>
+            </a:r>
+            <a:r>
+              <a:rPr lang="de-DE" sz="1600" dirty="0">
+                <a:latin typeface="Courier New" panose="02070309020205020404" pitchFamily="49" charset="0"/>
+                <a:cs typeface="Courier New" panose="02070309020205020404" pitchFamily="49" charset="0"/>
+              </a:rPr>
+              <a:t> </a:t>
+            </a:r>
+            <a:r>
+              <a:rPr lang="de-DE" sz="1600" dirty="0" err="1">
+                <a:latin typeface="Courier New" panose="02070309020205020404" pitchFamily="49" charset="0"/>
+                <a:cs typeface="Courier New" panose="02070309020205020404" pitchFamily="49" charset="0"/>
+              </a:rPr>
+              <a:t>the</a:t>
+            </a:r>
+            <a:r>
+              <a:rPr lang="de-DE" sz="1600" dirty="0">
+                <a:latin typeface="Courier New" panose="02070309020205020404" pitchFamily="49" charset="0"/>
+                <a:cs typeface="Courier New" panose="02070309020205020404" pitchFamily="49" charset="0"/>
+              </a:rPr>
+              <a:t> </a:t>
+            </a:r>
+            <a:r>
+              <a:rPr lang="de-DE" sz="1600" dirty="0" err="1">
+                <a:latin typeface="Courier New" panose="02070309020205020404" pitchFamily="49" charset="0"/>
+                <a:cs typeface="Courier New" panose="02070309020205020404" pitchFamily="49" charset="0"/>
+              </a:rPr>
+              <a:t>enemy</a:t>
+            </a:r>
+            <a:r>
+              <a:rPr lang="de-DE" sz="1600" dirty="0">
+                <a:latin typeface="Courier New" panose="02070309020205020404" pitchFamily="49" charset="0"/>
+                <a:cs typeface="Courier New" panose="02070309020205020404" pitchFamily="49" charset="0"/>
+              </a:rPr>
+              <a:t> </a:t>
+            </a:r>
+            <a:r>
+              <a:rPr lang="de-DE" sz="1600" dirty="0" err="1">
+                <a:latin typeface="Courier New" panose="02070309020205020404" pitchFamily="49" charset="0"/>
+                <a:cs typeface="Courier New" panose="02070309020205020404" pitchFamily="49" charset="0"/>
+              </a:rPr>
+              <a:t>who</a:t>
+            </a:r>
+            <a:r>
+              <a:rPr lang="de-DE" sz="1600" dirty="0">
+                <a:latin typeface="Courier New" panose="02070309020205020404" pitchFamily="49" charset="0"/>
+                <a:cs typeface="Courier New" panose="02070309020205020404" pitchFamily="49" charset="0"/>
+              </a:rPr>
+              <a:t> </a:t>
+            </a:r>
+            <a:r>
+              <a:rPr lang="de-DE" sz="1600" dirty="0" err="1">
+                <a:latin typeface="Courier New" panose="02070309020205020404" pitchFamily="49" charset="0"/>
+                <a:cs typeface="Courier New" panose="02070309020205020404" pitchFamily="49" charset="0"/>
+              </a:rPr>
+              <a:t>has</a:t>
+            </a:r>
+            <a:r>
+              <a:rPr lang="de-DE" sz="1600" dirty="0">
+                <a:latin typeface="Courier New" panose="02070309020205020404" pitchFamily="49" charset="0"/>
+                <a:cs typeface="Courier New" panose="02070309020205020404" pitchFamily="49" charset="0"/>
+              </a:rPr>
+              <a:t> </a:t>
+            </a:r>
+            <a:r>
+              <a:rPr lang="de-DE" sz="1600" dirty="0" err="1">
+                <a:latin typeface="Courier New" panose="02070309020205020404" pitchFamily="49" charset="0"/>
+                <a:cs typeface="Courier New" panose="02070309020205020404" pitchFamily="49" charset="0"/>
+              </a:rPr>
+              <a:t>the</a:t>
+            </a:r>
+            <a:r>
+              <a:rPr lang="de-DE" sz="1600" dirty="0">
+                <a:latin typeface="Courier New" panose="02070309020205020404" pitchFamily="49" charset="0"/>
+                <a:cs typeface="Courier New" panose="02070309020205020404" pitchFamily="49" charset="0"/>
+              </a:rPr>
+              <a:t> </a:t>
+            </a:r>
+            <a:r>
+              <a:rPr lang="de-DE" sz="1600" dirty="0" err="1">
+                <a:latin typeface="Courier New" panose="02070309020205020404" pitchFamily="49" charset="0"/>
+                <a:cs typeface="Courier New" panose="02070309020205020404" pitchFamily="49" charset="0"/>
+              </a:rPr>
+              <a:t>flag</a:t>
+            </a:r>
+            <a:br>
+              <a:rPr lang="de-DE" sz="1600" dirty="0">
+                <a:latin typeface="Courier New" panose="02070309020205020404" pitchFamily="49" charset="0"/>
+                <a:cs typeface="Courier New" panose="02070309020205020404" pitchFamily="49" charset="0"/>
+              </a:rPr>
+            </a:br>
+            <a:r>
+              <a:rPr lang="de-DE" sz="1600" dirty="0">
+                <a:latin typeface="Courier New" panose="02070309020205020404" pitchFamily="49" charset="0"/>
+                <a:cs typeface="Courier New" panose="02070309020205020404" pitchFamily="49" charset="0"/>
+              </a:rPr>
+              <a:t>    </a:t>
+            </a:r>
+            <a:r>
+              <a:rPr lang="de-DE" sz="1600" dirty="0" err="1">
+                <a:latin typeface="Courier New" panose="02070309020205020404" pitchFamily="49" charset="0"/>
+                <a:cs typeface="Courier New" panose="02070309020205020404" pitchFamily="49" charset="0"/>
+              </a:rPr>
+              <a:t>When</a:t>
+            </a:r>
+            <a:r>
+              <a:rPr lang="de-DE" sz="1600" dirty="0">
+                <a:latin typeface="Courier New" panose="02070309020205020404" pitchFamily="49" charset="0"/>
+                <a:cs typeface="Courier New" panose="02070309020205020404" pitchFamily="49" charset="0"/>
+              </a:rPr>
+              <a:t> </a:t>
+            </a:r>
+            <a:r>
+              <a:rPr lang="de-DE" sz="1600" dirty="0" err="1">
+                <a:latin typeface="Courier New" panose="02070309020205020404" pitchFamily="49" charset="0"/>
+                <a:cs typeface="Courier New" panose="02070309020205020404" pitchFamily="49" charset="0"/>
+              </a:rPr>
+              <a:t>the</a:t>
+            </a:r>
+            <a:r>
+              <a:rPr lang="de-DE" sz="1600" dirty="0">
+                <a:latin typeface="Courier New" panose="02070309020205020404" pitchFamily="49" charset="0"/>
+                <a:cs typeface="Courier New" panose="02070309020205020404" pitchFamily="49" charset="0"/>
+              </a:rPr>
+              <a:t> </a:t>
+            </a:r>
+            <a:r>
+              <a:rPr lang="de-DE" sz="1600" dirty="0" err="1">
+                <a:latin typeface="Courier New" panose="02070309020205020404" pitchFamily="49" charset="0"/>
+                <a:cs typeface="Courier New" panose="02070309020205020404" pitchFamily="49" charset="0"/>
+              </a:rPr>
+              <a:t>enemy</a:t>
+            </a:r>
+            <a:r>
+              <a:rPr lang="de-DE" sz="1600" dirty="0">
+                <a:latin typeface="Courier New" panose="02070309020205020404" pitchFamily="49" charset="0"/>
+                <a:cs typeface="Courier New" panose="02070309020205020404" pitchFamily="49" charset="0"/>
+              </a:rPr>
+              <a:t> </a:t>
+            </a:r>
+            <a:r>
+              <a:rPr lang="de-DE" sz="1600" dirty="0" err="1">
+                <a:latin typeface="Courier New" panose="02070309020205020404" pitchFamily="49" charset="0"/>
+                <a:cs typeface="Courier New" panose="02070309020205020404" pitchFamily="49" charset="0"/>
+              </a:rPr>
+              <a:t>who</a:t>
+            </a:r>
+            <a:r>
+              <a:rPr lang="de-DE" sz="1600" dirty="0">
+                <a:latin typeface="Courier New" panose="02070309020205020404" pitchFamily="49" charset="0"/>
+                <a:cs typeface="Courier New" panose="02070309020205020404" pitchFamily="49" charset="0"/>
+              </a:rPr>
+              <a:t> </a:t>
+            </a:r>
+            <a:r>
+              <a:rPr lang="de-DE" sz="1600" dirty="0" err="1">
+                <a:latin typeface="Courier New" panose="02070309020205020404" pitchFamily="49" charset="0"/>
+                <a:cs typeface="Courier New" panose="02070309020205020404" pitchFamily="49" charset="0"/>
+              </a:rPr>
+              <a:t>has</a:t>
+            </a:r>
+            <a:r>
+              <a:rPr lang="de-DE" sz="1600" dirty="0">
+                <a:latin typeface="Courier New" panose="02070309020205020404" pitchFamily="49" charset="0"/>
+                <a:cs typeface="Courier New" panose="02070309020205020404" pitchFamily="49" charset="0"/>
+              </a:rPr>
+              <a:t> </a:t>
+            </a:r>
+            <a:r>
+              <a:rPr lang="de-DE" sz="1600" dirty="0" err="1">
+                <a:latin typeface="Courier New" panose="02070309020205020404" pitchFamily="49" charset="0"/>
+                <a:cs typeface="Courier New" panose="02070309020205020404" pitchFamily="49" charset="0"/>
+              </a:rPr>
+              <a:t>the</a:t>
+            </a:r>
+            <a:r>
+              <a:rPr lang="de-DE" sz="1600" dirty="0">
+                <a:latin typeface="Courier New" panose="02070309020205020404" pitchFamily="49" charset="0"/>
+                <a:cs typeface="Courier New" panose="02070309020205020404" pitchFamily="49" charset="0"/>
+              </a:rPr>
+              <a:t> </a:t>
+            </a:r>
+            <a:r>
+              <a:rPr lang="de-DE" sz="1600" dirty="0" err="1">
+                <a:latin typeface="Courier New" panose="02070309020205020404" pitchFamily="49" charset="0"/>
+                <a:cs typeface="Courier New" panose="02070309020205020404" pitchFamily="49" charset="0"/>
+              </a:rPr>
+              <a:t>flag</a:t>
+            </a:r>
+            <a:r>
+              <a:rPr lang="de-DE" sz="1600" dirty="0">
+                <a:latin typeface="Courier New" panose="02070309020205020404" pitchFamily="49" charset="0"/>
+                <a:cs typeface="Courier New" panose="02070309020205020404" pitchFamily="49" charset="0"/>
+              </a:rPr>
+              <a:t> </a:t>
+            </a:r>
+            <a:r>
+              <a:rPr lang="de-DE" sz="1600" dirty="0" err="1">
+                <a:latin typeface="Courier New" panose="02070309020205020404" pitchFamily="49" charset="0"/>
+                <a:cs typeface="Courier New" panose="02070309020205020404" pitchFamily="49" charset="0"/>
+              </a:rPr>
+              <a:t>is</a:t>
+            </a:r>
+            <a:r>
+              <a:rPr lang="de-DE" sz="1600" dirty="0">
+                <a:latin typeface="Courier New" panose="02070309020205020404" pitchFamily="49" charset="0"/>
+                <a:cs typeface="Courier New" panose="02070309020205020404" pitchFamily="49" charset="0"/>
+              </a:rPr>
+              <a:t> </a:t>
+            </a:r>
+            <a:r>
+              <a:rPr lang="de-DE" sz="1600" dirty="0" err="1">
+                <a:latin typeface="Courier New" panose="02070309020205020404" pitchFamily="49" charset="0"/>
+                <a:cs typeface="Courier New" panose="02070309020205020404" pitchFamily="49" charset="0"/>
+              </a:rPr>
+              <a:t>taken</a:t>
+            </a:r>
+            <a:r>
+              <a:rPr lang="de-DE" sz="1600" dirty="0">
+                <a:latin typeface="Courier New" panose="02070309020205020404" pitchFamily="49" charset="0"/>
+                <a:cs typeface="Courier New" panose="02070309020205020404" pitchFamily="49" charset="0"/>
+              </a:rPr>
+              <a:t> down, </a:t>
+            </a:r>
+            <a:r>
+              <a:rPr lang="de-DE" sz="1600" dirty="0" err="1">
+                <a:latin typeface="Courier New" panose="02070309020205020404" pitchFamily="49" charset="0"/>
+                <a:cs typeface="Courier New" panose="02070309020205020404" pitchFamily="49" charset="0"/>
+              </a:rPr>
+              <a:t>the</a:t>
+            </a:r>
+            <a:r>
+              <a:rPr lang="de-DE" sz="1600" dirty="0">
+                <a:latin typeface="Courier New" panose="02070309020205020404" pitchFamily="49" charset="0"/>
+                <a:cs typeface="Courier New" panose="02070309020205020404" pitchFamily="49" charset="0"/>
+              </a:rPr>
+              <a:t> </a:t>
+            </a:r>
+            <a:r>
+              <a:rPr lang="de-DE" sz="1600" dirty="0" err="1">
+                <a:latin typeface="Courier New" panose="02070309020205020404" pitchFamily="49" charset="0"/>
+                <a:cs typeface="Courier New" panose="02070309020205020404" pitchFamily="49" charset="0"/>
+              </a:rPr>
+              <a:t>defenders</a:t>
+            </a:r>
+            <a:r>
+              <a:rPr lang="de-DE" sz="1600" dirty="0">
+                <a:latin typeface="Courier New" panose="02070309020205020404" pitchFamily="49" charset="0"/>
+                <a:cs typeface="Courier New" panose="02070309020205020404" pitchFamily="49" charset="0"/>
+              </a:rPr>
+              <a:t> </a:t>
+            </a:r>
+            <a:r>
+              <a:rPr lang="de-DE" sz="1600" dirty="0" err="1">
+                <a:latin typeface="Courier New" panose="02070309020205020404" pitchFamily="49" charset="0"/>
+                <a:cs typeface="Courier New" panose="02070309020205020404" pitchFamily="49" charset="0"/>
+              </a:rPr>
+              <a:t>go</a:t>
+            </a:r>
+            <a:r>
+              <a:rPr lang="de-DE" sz="1600" dirty="0">
+                <a:latin typeface="Courier New" panose="02070309020205020404" pitchFamily="49" charset="0"/>
+                <a:cs typeface="Courier New" panose="02070309020205020404" pitchFamily="49" charset="0"/>
+              </a:rPr>
+              <a:t> </a:t>
+            </a:r>
+            <a:r>
+              <a:rPr lang="de-DE" sz="1600" dirty="0" err="1">
+                <a:latin typeface="Courier New" panose="02070309020205020404" pitchFamily="49" charset="0"/>
+                <a:cs typeface="Courier New" panose="02070309020205020404" pitchFamily="49" charset="0"/>
+              </a:rPr>
+              <a:t>to</a:t>
+            </a:r>
+            <a:r>
+              <a:rPr lang="de-DE" sz="1600" dirty="0">
+                <a:latin typeface="Courier New" panose="02070309020205020404" pitchFamily="49" charset="0"/>
+                <a:cs typeface="Courier New" panose="02070309020205020404" pitchFamily="49" charset="0"/>
+              </a:rPr>
+              <a:t> </a:t>
+            </a:r>
+            <a:r>
+              <a:rPr lang="de-DE" sz="1600" dirty="0" err="1">
+                <a:latin typeface="Courier New" panose="02070309020205020404" pitchFamily="49" charset="0"/>
+                <a:cs typeface="Courier New" panose="02070309020205020404" pitchFamily="49" charset="0"/>
+              </a:rPr>
+              <a:t>take</a:t>
+            </a:r>
+            <a:r>
+              <a:rPr lang="de-DE" sz="1600" dirty="0">
+                <a:latin typeface="Courier New" panose="02070309020205020404" pitchFamily="49" charset="0"/>
+                <a:cs typeface="Courier New" panose="02070309020205020404" pitchFamily="49" charset="0"/>
+              </a:rPr>
+              <a:t> </a:t>
+            </a:r>
+            <a:r>
+              <a:rPr lang="de-DE" sz="1600" dirty="0" err="1">
+                <a:latin typeface="Courier New" panose="02070309020205020404" pitchFamily="49" charset="0"/>
+                <a:cs typeface="Courier New" panose="02070309020205020404" pitchFamily="49" charset="0"/>
+              </a:rPr>
+              <a:t>the</a:t>
+            </a:r>
+            <a:r>
+              <a:rPr lang="de-DE" sz="1600" dirty="0">
+                <a:latin typeface="Courier New" panose="02070309020205020404" pitchFamily="49" charset="0"/>
+                <a:cs typeface="Courier New" panose="02070309020205020404" pitchFamily="49" charset="0"/>
+              </a:rPr>
+              <a:t> </a:t>
+            </a:r>
+            <a:r>
+              <a:rPr lang="de-DE" sz="1600" dirty="0" err="1">
+                <a:latin typeface="Courier New" panose="02070309020205020404" pitchFamily="49" charset="0"/>
+                <a:cs typeface="Courier New" panose="02070309020205020404" pitchFamily="49" charset="0"/>
+              </a:rPr>
+              <a:t>flag</a:t>
+            </a:r>
+            <a:br>
+              <a:rPr lang="de-DE" sz="1600" dirty="0">
+                <a:latin typeface="Courier New" panose="02070309020205020404" pitchFamily="49" charset="0"/>
+                <a:cs typeface="Courier New" panose="02070309020205020404" pitchFamily="49" charset="0"/>
+              </a:rPr>
+            </a:br>
+            <a:r>
+              <a:rPr lang="de-DE" sz="1600" dirty="0">
+                <a:latin typeface="Courier New" panose="02070309020205020404" pitchFamily="49" charset="0"/>
+                <a:cs typeface="Courier New" panose="02070309020205020404" pitchFamily="49" charset="0"/>
+              </a:rPr>
+              <a:t>    */</a:t>
+            </a:r>
+            <a:br>
+              <a:rPr lang="de-DE" sz="1600" b="1" dirty="0">
+                <a:latin typeface="Courier New" panose="02070309020205020404" pitchFamily="49" charset="0"/>
+                <a:cs typeface="Courier New" panose="02070309020205020404" pitchFamily="49" charset="0"/>
+              </a:rPr>
+            </a:br>
+            <a:r>
+              <a:rPr lang="de-DE" sz="1600" b="1" dirty="0">
+                <a:latin typeface="Courier New" panose="02070309020205020404" pitchFamily="49" charset="0"/>
+                <a:cs typeface="Courier New" panose="02070309020205020404" pitchFamily="49" charset="0"/>
+              </a:rPr>
+              <a:t>    !</a:t>
+            </a:r>
+            <a:r>
+              <a:rPr lang="de-DE" sz="1600" b="1" dirty="0" err="1">
+                <a:latin typeface="Courier New" panose="02070309020205020404" pitchFamily="49" charset="0"/>
+                <a:cs typeface="Courier New" panose="02070309020205020404" pitchFamily="49" charset="0"/>
+              </a:rPr>
+              <a:t>add_task</a:t>
+            </a:r>
+            <a:r>
+              <a:rPr lang="de-DE" sz="1600" b="1" dirty="0">
+                <a:latin typeface="Courier New" panose="02070309020205020404" pitchFamily="49" charset="0"/>
+                <a:cs typeface="Courier New" panose="02070309020205020404" pitchFamily="49" charset="0"/>
+              </a:rPr>
+              <a:t>(</a:t>
+            </a:r>
+            <a:r>
+              <a:rPr lang="de-DE" sz="1600" b="1" dirty="0" err="1">
+                <a:latin typeface="Courier New" panose="02070309020205020404" pitchFamily="49" charset="0"/>
+                <a:cs typeface="Courier New" panose="02070309020205020404" pitchFamily="49" charset="0"/>
+              </a:rPr>
+              <a:t>task</a:t>
+            </a:r>
+            <a:r>
+              <a:rPr lang="de-DE" sz="1600" b="1" dirty="0">
+                <a:latin typeface="Courier New" panose="02070309020205020404" pitchFamily="49" charset="0"/>
+                <a:cs typeface="Courier New" panose="02070309020205020404" pitchFamily="49" charset="0"/>
+              </a:rPr>
+              <a:t>(P, "TASK_GOTO_POSITION", "Manager", </a:t>
+            </a:r>
+            <a:r>
+              <a:rPr lang="de-DE" sz="1600" b="1" dirty="0" err="1">
+                <a:latin typeface="Courier New" panose="02070309020205020404" pitchFamily="49" charset="0"/>
+                <a:cs typeface="Courier New" panose="02070309020205020404" pitchFamily="49" charset="0"/>
+              </a:rPr>
+              <a:t>NewDestination</a:t>
+            </a:r>
+            <a:r>
+              <a:rPr lang="de-DE" sz="1600" b="1" dirty="0">
+                <a:latin typeface="Courier New" panose="02070309020205020404" pitchFamily="49" charset="0"/>
+                <a:cs typeface="Courier New" panose="02070309020205020404" pitchFamily="49" charset="0"/>
+              </a:rPr>
+              <a:t>, ""));</a:t>
+            </a:r>
+            <a:br>
+              <a:rPr lang="de-DE" sz="1600" b="1" dirty="0">
+                <a:latin typeface="Courier New" panose="02070309020205020404" pitchFamily="49" charset="0"/>
+                <a:cs typeface="Courier New" panose="02070309020205020404" pitchFamily="49" charset="0"/>
+              </a:rPr>
+            </a:br>
+            <a:r>
+              <a:rPr lang="de-DE" sz="1600" b="1" dirty="0">
+                <a:latin typeface="Courier New" panose="02070309020205020404" pitchFamily="49" charset="0"/>
+                <a:cs typeface="Courier New" panose="02070309020205020404" pitchFamily="49" charset="0"/>
+              </a:rPr>
+              <a:t>    //.</a:t>
+            </a:r>
+            <a:r>
+              <a:rPr lang="de-DE" sz="1600" b="1" dirty="0" err="1">
+                <a:latin typeface="Courier New" panose="02070309020205020404" pitchFamily="49" charset="0"/>
+                <a:cs typeface="Courier New" panose="02070309020205020404" pitchFamily="49" charset="0"/>
+              </a:rPr>
+              <a:t>print</a:t>
+            </a:r>
+            <a:r>
+              <a:rPr lang="de-DE" sz="1600" b="1" dirty="0">
+                <a:latin typeface="Courier New" panose="02070309020205020404" pitchFamily="49" charset="0"/>
+                <a:cs typeface="Courier New" panose="02070309020205020404" pitchFamily="49" charset="0"/>
+              </a:rPr>
+              <a:t>("Enemy on </a:t>
+            </a:r>
+            <a:r>
+              <a:rPr lang="de-DE" sz="1600" b="1" dirty="0" err="1">
+                <a:latin typeface="Courier New" panose="02070309020205020404" pitchFamily="49" charset="0"/>
+                <a:cs typeface="Courier New" panose="02070309020205020404" pitchFamily="49" charset="0"/>
+              </a:rPr>
+              <a:t>the</a:t>
+            </a:r>
+            <a:r>
+              <a:rPr lang="de-DE" sz="1600" b="1" dirty="0">
+                <a:latin typeface="Courier New" panose="02070309020205020404" pitchFamily="49" charset="0"/>
+                <a:cs typeface="Courier New" panose="02070309020205020404" pitchFamily="49" charset="0"/>
+              </a:rPr>
+              <a:t> </a:t>
+            </a:r>
+            <a:r>
+              <a:rPr lang="de-DE" sz="1600" b="1" dirty="0" err="1">
+                <a:latin typeface="Courier New" panose="02070309020205020404" pitchFamily="49" charset="0"/>
+                <a:cs typeface="Courier New" panose="02070309020205020404" pitchFamily="49" charset="0"/>
+              </a:rPr>
+              <a:t>run</a:t>
+            </a:r>
+            <a:r>
+              <a:rPr lang="de-DE" sz="1600" b="1" dirty="0">
+                <a:latin typeface="Courier New" panose="02070309020205020404" pitchFamily="49" charset="0"/>
+                <a:cs typeface="Courier New" panose="02070309020205020404" pitchFamily="49" charset="0"/>
+              </a:rPr>
+              <a:t>!");</a:t>
+            </a:r>
+            <a:br>
+              <a:rPr lang="de-DE" sz="1600" b="1" dirty="0">
+                <a:latin typeface="Courier New" panose="02070309020205020404" pitchFamily="49" charset="0"/>
+                <a:cs typeface="Courier New" panose="02070309020205020404" pitchFamily="49" charset="0"/>
+              </a:rPr>
+            </a:br>
+            <a:r>
+              <a:rPr lang="de-DE" sz="1600" b="1" dirty="0">
+                <a:latin typeface="Courier New" panose="02070309020205020404" pitchFamily="49" charset="0"/>
+                <a:cs typeface="Courier New" panose="02070309020205020404" pitchFamily="49" charset="0"/>
+              </a:rPr>
+              <a:t>    -+</a:t>
+            </a:r>
+            <a:r>
+              <a:rPr lang="de-DE" sz="1600" b="1" dirty="0" err="1">
+                <a:latin typeface="Courier New" panose="02070309020205020404" pitchFamily="49" charset="0"/>
+                <a:cs typeface="Courier New" panose="02070309020205020404" pitchFamily="49" charset="0"/>
+              </a:rPr>
+              <a:t>state</a:t>
+            </a:r>
+            <a:r>
+              <a:rPr lang="de-DE" sz="1600" b="1" dirty="0">
+                <a:latin typeface="Courier New" panose="02070309020205020404" pitchFamily="49" charset="0"/>
+                <a:cs typeface="Courier New" panose="02070309020205020404" pitchFamily="49" charset="0"/>
+              </a:rPr>
+              <a:t>(</a:t>
+            </a:r>
+            <a:r>
+              <a:rPr lang="de-DE" sz="1600" b="1" dirty="0" err="1">
+                <a:latin typeface="Courier New" panose="02070309020205020404" pitchFamily="49" charset="0"/>
+                <a:cs typeface="Courier New" panose="02070309020205020404" pitchFamily="49" charset="0"/>
+              </a:rPr>
+              <a:t>standing</a:t>
+            </a:r>
+            <a:r>
+              <a:rPr lang="de-DE" sz="1600" b="1" dirty="0">
+                <a:latin typeface="Courier New" panose="02070309020205020404" pitchFamily="49" charset="0"/>
+                <a:cs typeface="Courier New" panose="02070309020205020404" pitchFamily="49" charset="0"/>
+              </a:rPr>
+              <a:t>);</a:t>
+            </a:r>
+            <a:br>
+              <a:rPr lang="de-DE" sz="1600" b="1" dirty="0">
+                <a:latin typeface="Courier New" panose="02070309020205020404" pitchFamily="49" charset="0"/>
+                <a:cs typeface="Courier New" panose="02070309020205020404" pitchFamily="49" charset="0"/>
+              </a:rPr>
+            </a:br>
+            <a:r>
+              <a:rPr lang="de-DE" sz="1600" b="1" dirty="0">
+                <a:latin typeface="Courier New" panose="02070309020205020404" pitchFamily="49" charset="0"/>
+                <a:cs typeface="Courier New" panose="02070309020205020404" pitchFamily="49" charset="0"/>
+              </a:rPr>
+              <a:t>    -+</a:t>
+            </a:r>
+            <a:r>
+              <a:rPr lang="de-DE" sz="1600" b="1" dirty="0" err="1">
+                <a:latin typeface="Courier New" panose="02070309020205020404" pitchFamily="49" charset="0"/>
+                <a:cs typeface="Courier New" panose="02070309020205020404" pitchFamily="49" charset="0"/>
+              </a:rPr>
+              <a:t>prio</a:t>
+            </a:r>
+            <a:r>
+              <a:rPr lang="de-DE" sz="1600" b="1" dirty="0">
+                <a:latin typeface="Courier New" panose="02070309020205020404" pitchFamily="49" charset="0"/>
+                <a:cs typeface="Courier New" panose="02070309020205020404" pitchFamily="49" charset="0"/>
+              </a:rPr>
+              <a:t>(P+1); </a:t>
+            </a:r>
+            <a:r>
+              <a:rPr lang="de-DE" sz="1600" dirty="0">
+                <a:latin typeface="Courier New" panose="02070309020205020404" pitchFamily="49" charset="0"/>
+                <a:cs typeface="Courier New" panose="02070309020205020404" pitchFamily="49" charset="0"/>
+              </a:rPr>
+              <a:t>// update </a:t>
+            </a:r>
+            <a:r>
+              <a:rPr lang="de-DE" sz="1600" dirty="0" err="1">
+                <a:latin typeface="Courier New" panose="02070309020205020404" pitchFamily="49" charset="0"/>
+                <a:cs typeface="Courier New" panose="02070309020205020404" pitchFamily="49" charset="0"/>
+              </a:rPr>
+              <a:t>the</a:t>
+            </a:r>
+            <a:r>
+              <a:rPr lang="de-DE" sz="1600" dirty="0">
+                <a:latin typeface="Courier New" panose="02070309020205020404" pitchFamily="49" charset="0"/>
+                <a:cs typeface="Courier New" panose="02070309020205020404" pitchFamily="49" charset="0"/>
+              </a:rPr>
+              <a:t> </a:t>
+            </a:r>
+            <a:r>
+              <a:rPr lang="de-DE" sz="1600" dirty="0" err="1">
+                <a:latin typeface="Courier New" panose="02070309020205020404" pitchFamily="49" charset="0"/>
+                <a:cs typeface="Courier New" panose="02070309020205020404" pitchFamily="49" charset="0"/>
+              </a:rPr>
+              <a:t>priority</a:t>
+            </a:r>
+            <a:r>
+              <a:rPr lang="de-DE" sz="1600" dirty="0">
+                <a:latin typeface="Courier New" panose="02070309020205020404" pitchFamily="49" charset="0"/>
+                <a:cs typeface="Courier New" panose="02070309020205020404" pitchFamily="49" charset="0"/>
+              </a:rPr>
+              <a:t> in </a:t>
+            </a:r>
+            <a:r>
+              <a:rPr lang="de-DE" sz="1600" dirty="0" err="1">
+                <a:latin typeface="Courier New" panose="02070309020205020404" pitchFamily="49" charset="0"/>
+                <a:cs typeface="Courier New" panose="02070309020205020404" pitchFamily="49" charset="0"/>
+              </a:rPr>
+              <a:t>order</a:t>
+            </a:r>
+            <a:r>
+              <a:rPr lang="de-DE" sz="1600" dirty="0">
+                <a:latin typeface="Courier New" panose="02070309020205020404" pitchFamily="49" charset="0"/>
+                <a:cs typeface="Courier New" panose="02070309020205020404" pitchFamily="49" charset="0"/>
+              </a:rPr>
+              <a:t> </a:t>
+            </a:r>
+            <a:r>
+              <a:rPr lang="de-DE" sz="1600" dirty="0" err="1">
+                <a:latin typeface="Courier New" panose="02070309020205020404" pitchFamily="49" charset="0"/>
+                <a:cs typeface="Courier New" panose="02070309020205020404" pitchFamily="49" charset="0"/>
+              </a:rPr>
+              <a:t>to</a:t>
+            </a:r>
+            <a:r>
+              <a:rPr lang="de-DE" sz="1600" dirty="0">
+                <a:latin typeface="Courier New" panose="02070309020205020404" pitchFamily="49" charset="0"/>
+                <a:cs typeface="Courier New" panose="02070309020205020404" pitchFamily="49" charset="0"/>
+              </a:rPr>
+              <a:t> </a:t>
+            </a:r>
+            <a:r>
+              <a:rPr lang="de-DE" sz="1600" dirty="0" err="1">
+                <a:latin typeface="Courier New" panose="02070309020205020404" pitchFamily="49" charset="0"/>
+                <a:cs typeface="Courier New" panose="02070309020205020404" pitchFamily="49" charset="0"/>
+              </a:rPr>
+              <a:t>keep</a:t>
+            </a:r>
+            <a:r>
+              <a:rPr lang="de-DE" sz="1600" dirty="0">
+                <a:latin typeface="Courier New" panose="02070309020205020404" pitchFamily="49" charset="0"/>
+                <a:cs typeface="Courier New" panose="02070309020205020404" pitchFamily="49" charset="0"/>
+              </a:rPr>
+              <a:t> </a:t>
+            </a:r>
+            <a:r>
+              <a:rPr lang="de-DE" sz="1600" dirty="0" err="1">
+                <a:latin typeface="Courier New" panose="02070309020205020404" pitchFamily="49" charset="0"/>
+                <a:cs typeface="Courier New" panose="02070309020205020404" pitchFamily="49" charset="0"/>
+              </a:rPr>
+              <a:t>the</a:t>
+            </a:r>
+            <a:r>
+              <a:rPr lang="de-DE" sz="1600" dirty="0">
+                <a:latin typeface="Courier New" panose="02070309020205020404" pitchFamily="49" charset="0"/>
+                <a:cs typeface="Courier New" panose="02070309020205020404" pitchFamily="49" charset="0"/>
+              </a:rPr>
+              <a:t> </a:t>
+            </a:r>
+            <a:r>
+              <a:rPr lang="de-DE" sz="1600" dirty="0" err="1">
+                <a:latin typeface="Courier New" panose="02070309020205020404" pitchFamily="49" charset="0"/>
+                <a:cs typeface="Courier New" panose="02070309020205020404" pitchFamily="49" charset="0"/>
+              </a:rPr>
+              <a:t>character</a:t>
+            </a:r>
+            <a:r>
+              <a:rPr lang="de-DE" sz="1600" dirty="0">
+                <a:latin typeface="Courier New" panose="02070309020205020404" pitchFamily="49" charset="0"/>
+                <a:cs typeface="Courier New" panose="02070309020205020404" pitchFamily="49" charset="0"/>
+              </a:rPr>
+              <a:t> </a:t>
+            </a:r>
+            <a:r>
+              <a:rPr lang="de-DE" sz="1600" dirty="0" err="1">
+                <a:latin typeface="Courier New" panose="02070309020205020404" pitchFamily="49" charset="0"/>
+                <a:cs typeface="Courier New" panose="02070309020205020404" pitchFamily="49" charset="0"/>
+              </a:rPr>
+              <a:t>following</a:t>
+            </a:r>
+            <a:r>
+              <a:rPr lang="de-DE" sz="1600" dirty="0">
+                <a:latin typeface="Courier New" panose="02070309020205020404" pitchFamily="49" charset="0"/>
+                <a:cs typeface="Courier New" panose="02070309020205020404" pitchFamily="49" charset="0"/>
+              </a:rPr>
+              <a:t> </a:t>
+            </a:r>
+            <a:r>
+              <a:rPr lang="de-DE" sz="1600" dirty="0" err="1">
+                <a:latin typeface="Courier New" panose="02070309020205020404" pitchFamily="49" charset="0"/>
+                <a:cs typeface="Courier New" panose="02070309020205020404" pitchFamily="49" charset="0"/>
+              </a:rPr>
+              <a:t>the</a:t>
+            </a:r>
+            <a:r>
+              <a:rPr lang="de-DE" sz="1600" dirty="0">
+                <a:latin typeface="Courier New" panose="02070309020205020404" pitchFamily="49" charset="0"/>
+                <a:cs typeface="Courier New" panose="02070309020205020404" pitchFamily="49" charset="0"/>
+              </a:rPr>
+              <a:t> </a:t>
+            </a:r>
+            <a:r>
+              <a:rPr lang="de-DE" sz="1600" dirty="0" err="1">
+                <a:latin typeface="Courier New" panose="02070309020205020404" pitchFamily="49" charset="0"/>
+                <a:cs typeface="Courier New" panose="02070309020205020404" pitchFamily="49" charset="0"/>
+              </a:rPr>
+              <a:t>enemy</a:t>
+            </a:r>
+            <a:r>
+              <a:rPr lang="de-DE" sz="1600" dirty="0">
+                <a:latin typeface="Courier New" panose="02070309020205020404" pitchFamily="49" charset="0"/>
+                <a:cs typeface="Courier New" panose="02070309020205020404" pitchFamily="49" charset="0"/>
+              </a:rPr>
+              <a:t> </a:t>
+            </a:r>
+            <a:r>
+              <a:rPr lang="de-DE" sz="1600" dirty="0" err="1">
+                <a:latin typeface="Courier New" panose="02070309020205020404" pitchFamily="49" charset="0"/>
+                <a:cs typeface="Courier New" panose="02070309020205020404" pitchFamily="49" charset="0"/>
+              </a:rPr>
+              <a:t>soldier</a:t>
+            </a:r>
+            <a:r>
+              <a:rPr lang="de-DE" sz="1600" b="1" dirty="0">
+                <a:latin typeface="Courier New" panose="02070309020205020404" pitchFamily="49" charset="0"/>
+                <a:cs typeface="Courier New" panose="02070309020205020404" pitchFamily="49" charset="0"/>
+              </a:rPr>
+              <a:t> }.</a:t>
+            </a:r>
+            <a:endParaRPr lang="de-ES" sz="1600" b="1" dirty="0">
+              <a:latin typeface="Courier New" panose="02070309020205020404" pitchFamily="49" charset="0"/>
+              <a:cs typeface="Courier New" panose="02070309020205020404" pitchFamily="49" charset="0"/>
+            </a:endParaRPr>
           </a:p>
         </p:txBody>
       </p:sp>
@@ -7179,7 +9948,7 @@
 </p:sld>
 </file>
 
-<file path=ppt/slides/slide8.xml><?xml version="1.0" encoding="utf-8"?>
+<file path=ppt/slides/slide7.xml><?xml version="1.0" encoding="utf-8"?>
 <p:sld xmlns:a="http://schemas.openxmlformats.org/drawingml/2006/main" xmlns:r="http://schemas.openxmlformats.org/officeDocument/2006/relationships" xmlns:p="http://schemas.openxmlformats.org/presentationml/2006/main">
   <p:cSld>
     <p:spTree>

</xml_diff>